<commit_message>
bugs fixed and updates
</commit_message>
<xml_diff>
--- a/figures/Final_curves/all_curves_figure/all_prob_curves_figure.pptx
+++ b/figures/Final_curves/all_curves_figure/all_prob_curves_figure.pptx
@@ -8,6 +8,7 @@
     <p:sldId id="256" r:id="rId2"/>
     <p:sldId id="257" r:id="rId3"/>
     <p:sldId id="258" r:id="rId4"/>
+    <p:sldId id="259" r:id="rId5"/>
   </p:sldIdLst>
   <p:sldSz cx="12192000" cy="6858000"/>
   <p:notesSz cx="6858000" cy="9144000"/>
@@ -261,7 +262,7 @@
           <a:p>
             <a:fld id="{CDAAAE56-9381-AA46-B7ED-272EFF99F605}" type="datetimeFigureOut">
               <a:rPr lang="en-US" smtClean="0"/>
-              <a:t>9/16/20</a:t>
+              <a:t>10/13/20</a:t>
             </a:fld>
             <a:endParaRPr lang="en-US"/>
           </a:p>
@@ -459,7 +460,7 @@
           <a:p>
             <a:fld id="{CDAAAE56-9381-AA46-B7ED-272EFF99F605}" type="datetimeFigureOut">
               <a:rPr lang="en-US" smtClean="0"/>
-              <a:t>9/16/20</a:t>
+              <a:t>10/13/20</a:t>
             </a:fld>
             <a:endParaRPr lang="en-US"/>
           </a:p>
@@ -667,7 +668,7 @@
           <a:p>
             <a:fld id="{CDAAAE56-9381-AA46-B7ED-272EFF99F605}" type="datetimeFigureOut">
               <a:rPr lang="en-US" smtClean="0"/>
-              <a:t>9/16/20</a:t>
+              <a:t>10/13/20</a:t>
             </a:fld>
             <a:endParaRPr lang="en-US"/>
           </a:p>
@@ -865,7 +866,7 @@
           <a:p>
             <a:fld id="{CDAAAE56-9381-AA46-B7ED-272EFF99F605}" type="datetimeFigureOut">
               <a:rPr lang="en-US" smtClean="0"/>
-              <a:t>9/16/20</a:t>
+              <a:t>10/13/20</a:t>
             </a:fld>
             <a:endParaRPr lang="en-US"/>
           </a:p>
@@ -1140,7 +1141,7 @@
           <a:p>
             <a:fld id="{CDAAAE56-9381-AA46-B7ED-272EFF99F605}" type="datetimeFigureOut">
               <a:rPr lang="en-US" smtClean="0"/>
-              <a:t>9/16/20</a:t>
+              <a:t>10/13/20</a:t>
             </a:fld>
             <a:endParaRPr lang="en-US"/>
           </a:p>
@@ -1405,7 +1406,7 @@
           <a:p>
             <a:fld id="{CDAAAE56-9381-AA46-B7ED-272EFF99F605}" type="datetimeFigureOut">
               <a:rPr lang="en-US" smtClean="0"/>
-              <a:t>9/16/20</a:t>
+              <a:t>10/13/20</a:t>
             </a:fld>
             <a:endParaRPr lang="en-US"/>
           </a:p>
@@ -1817,7 +1818,7 @@
           <a:p>
             <a:fld id="{CDAAAE56-9381-AA46-B7ED-272EFF99F605}" type="datetimeFigureOut">
               <a:rPr lang="en-US" smtClean="0"/>
-              <a:t>9/16/20</a:t>
+              <a:t>10/13/20</a:t>
             </a:fld>
             <a:endParaRPr lang="en-US"/>
           </a:p>
@@ -1958,7 +1959,7 @@
           <a:p>
             <a:fld id="{CDAAAE56-9381-AA46-B7ED-272EFF99F605}" type="datetimeFigureOut">
               <a:rPr lang="en-US" smtClean="0"/>
-              <a:t>9/16/20</a:t>
+              <a:t>10/13/20</a:t>
             </a:fld>
             <a:endParaRPr lang="en-US"/>
           </a:p>
@@ -2071,7 +2072,7 @@
           <a:p>
             <a:fld id="{CDAAAE56-9381-AA46-B7ED-272EFF99F605}" type="datetimeFigureOut">
               <a:rPr lang="en-US" smtClean="0"/>
-              <a:t>9/16/20</a:t>
+              <a:t>10/13/20</a:t>
             </a:fld>
             <a:endParaRPr lang="en-US"/>
           </a:p>
@@ -2382,7 +2383,7 @@
           <a:p>
             <a:fld id="{CDAAAE56-9381-AA46-B7ED-272EFF99F605}" type="datetimeFigureOut">
               <a:rPr lang="en-US" smtClean="0"/>
-              <a:t>9/16/20</a:t>
+              <a:t>10/13/20</a:t>
             </a:fld>
             <a:endParaRPr lang="en-US"/>
           </a:p>
@@ -2670,7 +2671,7 @@
           <a:p>
             <a:fld id="{CDAAAE56-9381-AA46-B7ED-272EFF99F605}" type="datetimeFigureOut">
               <a:rPr lang="en-US" smtClean="0"/>
-              <a:t>9/16/20</a:t>
+              <a:t>10/13/20</a:t>
             </a:fld>
             <a:endParaRPr lang="en-US"/>
           </a:p>
@@ -2911,7 +2912,7 @@
           <a:p>
             <a:fld id="{CDAAAE56-9381-AA46-B7ED-272EFF99F605}" type="datetimeFigureOut">
               <a:rPr lang="en-US" smtClean="0"/>
-              <a:t>9/16/20</a:t>
+              <a:t>10/13/20</a:t>
             </a:fld>
             <a:endParaRPr lang="en-US"/>
           </a:p>
@@ -4331,6 +4332,291 @@
 </p:sld>
 </file>
 
+<file path=ppt/slides/slide4.xml><?xml version="1.0" encoding="utf-8"?>
+<p:sld xmlns:a="http://schemas.openxmlformats.org/drawingml/2006/main" xmlns:r="http://schemas.openxmlformats.org/officeDocument/2006/relationships" xmlns:p="http://schemas.openxmlformats.org/presentationml/2006/main">
+  <p:cSld>
+    <p:spTree>
+      <p:nvGrpSpPr>
+        <p:cNvPr id="1" name=""/>
+        <p:cNvGrpSpPr/>
+        <p:nvPr/>
+      </p:nvGrpSpPr>
+      <p:grpSpPr>
+        <a:xfrm>
+          <a:off x="0" y="0"/>
+          <a:ext cx="0" cy="0"/>
+          <a:chOff x="0" y="0"/>
+          <a:chExt cx="0" cy="0"/>
+        </a:xfrm>
+      </p:grpSpPr>
+      <p:grpSp>
+        <p:nvGrpSpPr>
+          <p:cNvPr id="24" name="Group 23">
+            <a:extLst>
+              <a:ext uri="{FF2B5EF4-FFF2-40B4-BE49-F238E27FC236}">
+                <a16:creationId xmlns:a16="http://schemas.microsoft.com/office/drawing/2014/main" id="{157FBF9E-9D40-E841-9FEF-9242ABEA93FB}"/>
+              </a:ext>
+            </a:extLst>
+          </p:cNvPr>
+          <p:cNvGrpSpPr/>
+          <p:nvPr/>
+        </p:nvGrpSpPr>
+        <p:grpSpPr>
+          <a:xfrm>
+            <a:off x="198738" y="108121"/>
+            <a:ext cx="11028406" cy="6641759"/>
+            <a:chOff x="198738" y="108121"/>
+            <a:chExt cx="11028406" cy="6641759"/>
+          </a:xfrm>
+        </p:grpSpPr>
+        <p:pic>
+          <p:nvPicPr>
+            <p:cNvPr id="19" name="Picture 18" descr="Graphical user interface, application&#10;&#10;Description automatically generated">
+              <a:extLst>
+                <a:ext uri="{FF2B5EF4-FFF2-40B4-BE49-F238E27FC236}">
+                  <a16:creationId xmlns:a16="http://schemas.microsoft.com/office/drawing/2014/main" id="{DD95C137-6A40-6B4D-BA23-37C8A5767926}"/>
+                </a:ext>
+              </a:extLst>
+            </p:cNvPr>
+            <p:cNvPicPr>
+              <a:picLocks noChangeAspect="1"/>
+            </p:cNvPicPr>
+            <p:nvPr/>
+          </p:nvPicPr>
+          <p:blipFill>
+            <a:blip r:embed="rId2"/>
+            <a:stretch>
+              <a:fillRect/>
+            </a:stretch>
+          </p:blipFill>
+          <p:spPr>
+            <a:xfrm>
+              <a:off x="5692346" y="108121"/>
+              <a:ext cx="5534798" cy="6641758"/>
+            </a:xfrm>
+            <a:prstGeom prst="rect">
+              <a:avLst/>
+            </a:prstGeom>
+          </p:spPr>
+        </p:pic>
+        <p:pic>
+          <p:nvPicPr>
+            <p:cNvPr id="21" name="Picture 20" descr="A picture containing graphical user interface, diagram&#10;&#10;Description automatically generated">
+              <a:extLst>
+                <a:ext uri="{FF2B5EF4-FFF2-40B4-BE49-F238E27FC236}">
+                  <a16:creationId xmlns:a16="http://schemas.microsoft.com/office/drawing/2014/main" id="{16823DB8-8C83-7642-947E-234D82FD8192}"/>
+                </a:ext>
+              </a:extLst>
+            </p:cNvPr>
+            <p:cNvPicPr>
+              <a:picLocks noChangeAspect="1"/>
+            </p:cNvPicPr>
+            <p:nvPr/>
+          </p:nvPicPr>
+          <p:blipFill>
+            <a:blip r:embed="rId3"/>
+            <a:stretch>
+              <a:fillRect/>
+            </a:stretch>
+          </p:blipFill>
+          <p:spPr>
+            <a:xfrm>
+              <a:off x="198738" y="108122"/>
+              <a:ext cx="5534799" cy="6641758"/>
+            </a:xfrm>
+            <a:prstGeom prst="rect">
+              <a:avLst/>
+            </a:prstGeom>
+          </p:spPr>
+        </p:pic>
+        <p:sp>
+          <p:nvSpPr>
+            <p:cNvPr id="22" name="Rectangle 21">
+              <a:extLst>
+                <a:ext uri="{FF2B5EF4-FFF2-40B4-BE49-F238E27FC236}">
+                  <a16:creationId xmlns:a16="http://schemas.microsoft.com/office/drawing/2014/main" id="{A2891527-AABE-B144-ABE6-8A4626553847}"/>
+                </a:ext>
+              </a:extLst>
+            </p:cNvPr>
+            <p:cNvSpPr/>
+            <p:nvPr/>
+          </p:nvSpPr>
+          <p:spPr>
+            <a:xfrm>
+              <a:off x="6096000" y="108121"/>
+              <a:ext cx="2862649" cy="200798"/>
+            </a:xfrm>
+            <a:prstGeom prst="rect">
+              <a:avLst/>
+            </a:prstGeom>
+            <a:solidFill>
+              <a:schemeClr val="bg1"/>
+            </a:solidFill>
+            <a:ln>
+              <a:noFill/>
+            </a:ln>
+          </p:spPr>
+          <p:style>
+            <a:lnRef idx="2">
+              <a:schemeClr val="accent1">
+                <a:shade val="50000"/>
+              </a:schemeClr>
+            </a:lnRef>
+            <a:fillRef idx="1">
+              <a:schemeClr val="accent1"/>
+            </a:fillRef>
+            <a:effectRef idx="0">
+              <a:schemeClr val="accent1"/>
+            </a:effectRef>
+            <a:fontRef idx="minor">
+              <a:schemeClr val="lt1"/>
+            </a:fontRef>
+          </p:style>
+          <p:txBody>
+            <a:bodyPr rtlCol="0" anchor="ctr"/>
+            <a:lstStyle/>
+            <a:p>
+              <a:pPr algn="ctr"/>
+              <a:endParaRPr lang="en-US"/>
+            </a:p>
+          </p:txBody>
+        </p:sp>
+        <p:sp>
+          <p:nvSpPr>
+            <p:cNvPr id="23" name="Rectangle 22">
+              <a:extLst>
+                <a:ext uri="{FF2B5EF4-FFF2-40B4-BE49-F238E27FC236}">
+                  <a16:creationId xmlns:a16="http://schemas.microsoft.com/office/drawing/2014/main" id="{4FA2C797-4D91-AD4F-A1E6-ACED8F187899}"/>
+                </a:ext>
+              </a:extLst>
+            </p:cNvPr>
+            <p:cNvSpPr/>
+            <p:nvPr/>
+          </p:nvSpPr>
+          <p:spPr>
+            <a:xfrm>
+              <a:off x="561202" y="108121"/>
+              <a:ext cx="2862649" cy="200798"/>
+            </a:xfrm>
+            <a:prstGeom prst="rect">
+              <a:avLst/>
+            </a:prstGeom>
+            <a:solidFill>
+              <a:schemeClr val="bg1"/>
+            </a:solidFill>
+            <a:ln>
+              <a:noFill/>
+            </a:ln>
+          </p:spPr>
+          <p:style>
+            <a:lnRef idx="2">
+              <a:schemeClr val="accent1">
+                <a:shade val="50000"/>
+              </a:schemeClr>
+            </a:lnRef>
+            <a:fillRef idx="1">
+              <a:schemeClr val="accent1"/>
+            </a:fillRef>
+            <a:effectRef idx="0">
+              <a:schemeClr val="accent1"/>
+            </a:effectRef>
+            <a:fontRef idx="minor">
+              <a:schemeClr val="lt1"/>
+            </a:fontRef>
+          </p:style>
+          <p:txBody>
+            <a:bodyPr rtlCol="0" anchor="ctr"/>
+            <a:lstStyle/>
+            <a:p>
+              <a:pPr algn="ctr"/>
+              <a:endParaRPr lang="en-US"/>
+            </a:p>
+          </p:txBody>
+        </p:sp>
+      </p:grpSp>
+      <p:sp>
+        <p:nvSpPr>
+          <p:cNvPr id="25" name="TextBox 24">
+            <a:extLst>
+              <a:ext uri="{FF2B5EF4-FFF2-40B4-BE49-F238E27FC236}">
+                <a16:creationId xmlns:a16="http://schemas.microsoft.com/office/drawing/2014/main" id="{6718DB7D-38EE-BB44-AD97-509EF3C4F9DD}"/>
+              </a:ext>
+            </a:extLst>
+          </p:cNvPr>
+          <p:cNvSpPr txBox="1"/>
+          <p:nvPr/>
+        </p:nvSpPr>
+        <p:spPr>
+          <a:xfrm>
+            <a:off x="74655" y="208520"/>
+            <a:ext cx="569440" cy="369332"/>
+          </a:xfrm>
+          <a:prstGeom prst="rect">
+            <a:avLst/>
+          </a:prstGeom>
+          <a:noFill/>
+        </p:spPr>
+        <p:txBody>
+          <a:bodyPr wrap="square" rtlCol="0">
+            <a:spAutoFit/>
+          </a:bodyPr>
+          <a:lstStyle/>
+          <a:p>
+            <a:r>
+              <a:rPr lang="en-US" dirty="0"/>
+              <a:t>a)</a:t>
+            </a:r>
+          </a:p>
+        </p:txBody>
+      </p:sp>
+      <p:sp>
+        <p:nvSpPr>
+          <p:cNvPr id="26" name="TextBox 25">
+            <a:extLst>
+              <a:ext uri="{FF2B5EF4-FFF2-40B4-BE49-F238E27FC236}">
+                <a16:creationId xmlns:a16="http://schemas.microsoft.com/office/drawing/2014/main" id="{0AB040A8-2F7C-7E4E-8B0F-CAD8F60A7F24}"/>
+              </a:ext>
+            </a:extLst>
+          </p:cNvPr>
+          <p:cNvSpPr txBox="1"/>
+          <p:nvPr/>
+        </p:nvSpPr>
+        <p:spPr>
+          <a:xfrm>
+            <a:off x="5754131" y="208520"/>
+            <a:ext cx="569440" cy="369332"/>
+          </a:xfrm>
+          <a:prstGeom prst="rect">
+            <a:avLst/>
+          </a:prstGeom>
+          <a:noFill/>
+        </p:spPr>
+        <p:txBody>
+          <a:bodyPr wrap="square" rtlCol="0">
+            <a:spAutoFit/>
+          </a:bodyPr>
+          <a:lstStyle/>
+          <a:p>
+            <a:r>
+              <a:rPr lang="en-US" dirty="0"/>
+              <a:t>b)</a:t>
+            </a:r>
+          </a:p>
+        </p:txBody>
+      </p:sp>
+    </p:spTree>
+    <p:extLst>
+      <p:ext uri="{BB962C8B-B14F-4D97-AF65-F5344CB8AC3E}">
+        <p14:creationId xmlns:p14="http://schemas.microsoft.com/office/powerpoint/2010/main" val="1615842868"/>
+      </p:ext>
+    </p:extLst>
+  </p:cSld>
+  <p:clrMapOvr>
+    <a:masterClrMapping/>
+  </p:clrMapOvr>
+</p:sld>
+</file>
+
 <file path=ppt/theme/theme1.xml><?xml version="1.0" encoding="utf-8"?>
 <a:theme xmlns:a="http://schemas.openxmlformats.org/drawingml/2006/main" name="Office Theme">
   <a:themeElements>

</xml_diff>

<commit_message>
cladophora bug fixed, high res figures
</commit_message>
<xml_diff>
--- a/figures/Final_curves/all_curves_figure/all_prob_curves_figure.pptx
+++ b/figures/Final_curves/all_curves_figure/all_prob_curves_figure.pptx
@@ -6,9 +6,16 @@
   </p:sldMasterIdLst>
   <p:sldIdLst>
     <p:sldId id="256" r:id="rId2"/>
-    <p:sldId id="257" r:id="rId3"/>
-    <p:sldId id="258" r:id="rId4"/>
-    <p:sldId id="259" r:id="rId5"/>
+    <p:sldId id="266" r:id="rId3"/>
+    <p:sldId id="257" r:id="rId4"/>
+    <p:sldId id="258" r:id="rId5"/>
+    <p:sldId id="263" r:id="rId6"/>
+    <p:sldId id="264" r:id="rId7"/>
+    <p:sldId id="265" r:id="rId8"/>
+    <p:sldId id="259" r:id="rId9"/>
+    <p:sldId id="260" r:id="rId10"/>
+    <p:sldId id="261" r:id="rId11"/>
+    <p:sldId id="262" r:id="rId12"/>
   </p:sldIdLst>
   <p:sldSz cx="12192000" cy="6858000"/>
   <p:notesSz cx="6858000" cy="9144000"/>
@@ -262,7 +269,7 @@
           <a:p>
             <a:fld id="{CDAAAE56-9381-AA46-B7ED-272EFF99F605}" type="datetimeFigureOut">
               <a:rPr lang="en-US" smtClean="0"/>
-              <a:t>10/13/20</a:t>
+              <a:t>12/17/20</a:t>
             </a:fld>
             <a:endParaRPr lang="en-US"/>
           </a:p>
@@ -460,7 +467,7 @@
           <a:p>
             <a:fld id="{CDAAAE56-9381-AA46-B7ED-272EFF99F605}" type="datetimeFigureOut">
               <a:rPr lang="en-US" smtClean="0"/>
-              <a:t>10/13/20</a:t>
+              <a:t>12/17/20</a:t>
             </a:fld>
             <a:endParaRPr lang="en-US"/>
           </a:p>
@@ -668,7 +675,7 @@
           <a:p>
             <a:fld id="{CDAAAE56-9381-AA46-B7ED-272EFF99F605}" type="datetimeFigureOut">
               <a:rPr lang="en-US" smtClean="0"/>
-              <a:t>10/13/20</a:t>
+              <a:t>12/17/20</a:t>
             </a:fld>
             <a:endParaRPr lang="en-US"/>
           </a:p>
@@ -866,7 +873,7 @@
           <a:p>
             <a:fld id="{CDAAAE56-9381-AA46-B7ED-272EFF99F605}" type="datetimeFigureOut">
               <a:rPr lang="en-US" smtClean="0"/>
-              <a:t>10/13/20</a:t>
+              <a:t>12/17/20</a:t>
             </a:fld>
             <a:endParaRPr lang="en-US"/>
           </a:p>
@@ -1141,7 +1148,7 @@
           <a:p>
             <a:fld id="{CDAAAE56-9381-AA46-B7ED-272EFF99F605}" type="datetimeFigureOut">
               <a:rPr lang="en-US" smtClean="0"/>
-              <a:t>10/13/20</a:t>
+              <a:t>12/17/20</a:t>
             </a:fld>
             <a:endParaRPr lang="en-US"/>
           </a:p>
@@ -1406,7 +1413,7 @@
           <a:p>
             <a:fld id="{CDAAAE56-9381-AA46-B7ED-272EFF99F605}" type="datetimeFigureOut">
               <a:rPr lang="en-US" smtClean="0"/>
-              <a:t>10/13/20</a:t>
+              <a:t>12/17/20</a:t>
             </a:fld>
             <a:endParaRPr lang="en-US"/>
           </a:p>
@@ -1818,7 +1825,7 @@
           <a:p>
             <a:fld id="{CDAAAE56-9381-AA46-B7ED-272EFF99F605}" type="datetimeFigureOut">
               <a:rPr lang="en-US" smtClean="0"/>
-              <a:t>10/13/20</a:t>
+              <a:t>12/17/20</a:t>
             </a:fld>
             <a:endParaRPr lang="en-US"/>
           </a:p>
@@ -1959,7 +1966,7 @@
           <a:p>
             <a:fld id="{CDAAAE56-9381-AA46-B7ED-272EFF99F605}" type="datetimeFigureOut">
               <a:rPr lang="en-US" smtClean="0"/>
-              <a:t>10/13/20</a:t>
+              <a:t>12/17/20</a:t>
             </a:fld>
             <a:endParaRPr lang="en-US"/>
           </a:p>
@@ -2072,7 +2079,7 @@
           <a:p>
             <a:fld id="{CDAAAE56-9381-AA46-B7ED-272EFF99F605}" type="datetimeFigureOut">
               <a:rPr lang="en-US" smtClean="0"/>
-              <a:t>10/13/20</a:t>
+              <a:t>12/17/20</a:t>
             </a:fld>
             <a:endParaRPr lang="en-US"/>
           </a:p>
@@ -2383,7 +2390,7 @@
           <a:p>
             <a:fld id="{CDAAAE56-9381-AA46-B7ED-272EFF99F605}" type="datetimeFigureOut">
               <a:rPr lang="en-US" smtClean="0"/>
-              <a:t>10/13/20</a:t>
+              <a:t>12/17/20</a:t>
             </a:fld>
             <a:endParaRPr lang="en-US"/>
           </a:p>
@@ -2671,7 +2678,7 @@
           <a:p>
             <a:fld id="{CDAAAE56-9381-AA46-B7ED-272EFF99F605}" type="datetimeFigureOut">
               <a:rPr lang="en-US" smtClean="0"/>
-              <a:t>10/13/20</a:t>
+              <a:t>12/17/20</a:t>
             </a:fld>
             <a:endParaRPr lang="en-US"/>
           </a:p>
@@ -2912,7 +2919,7 @@
           <a:p>
             <a:fld id="{CDAAAE56-9381-AA46-B7ED-272EFF99F605}" type="datetimeFigureOut">
               <a:rPr lang="en-US" smtClean="0"/>
-              <a:t>10/13/20</a:t>
+              <a:t>12/17/20</a:t>
             </a:fld>
             <a:endParaRPr lang="en-US"/>
           </a:p>
@@ -3843,7 +3850,873 @@
 </p:sld>
 </file>
 
+<file path=ppt/slides/slide10.xml><?xml version="1.0" encoding="utf-8"?>
+<p:sld xmlns:a="http://schemas.openxmlformats.org/drawingml/2006/main" xmlns:r="http://schemas.openxmlformats.org/officeDocument/2006/relationships" xmlns:p="http://schemas.openxmlformats.org/presentationml/2006/main">
+  <p:cSld>
+    <p:spTree>
+      <p:nvGrpSpPr>
+        <p:cNvPr id="1" name=""/>
+        <p:cNvGrpSpPr/>
+        <p:nvPr/>
+      </p:nvGrpSpPr>
+      <p:grpSpPr>
+        <a:xfrm>
+          <a:off x="0" y="0"/>
+          <a:ext cx="0" cy="0"/>
+          <a:chOff x="0" y="0"/>
+          <a:chExt cx="0" cy="0"/>
+        </a:xfrm>
+      </p:grpSpPr>
+      <p:sp>
+        <p:nvSpPr>
+          <p:cNvPr id="2" name="Title 1">
+            <a:extLst>
+              <a:ext uri="{FF2B5EF4-FFF2-40B4-BE49-F238E27FC236}">
+                <a16:creationId xmlns:a16="http://schemas.microsoft.com/office/drawing/2014/main" id="{2158FDC7-10D5-E142-8149-947DED87180F}"/>
+              </a:ext>
+            </a:extLst>
+          </p:cNvPr>
+          <p:cNvSpPr>
+            <a:spLocks noGrp="1"/>
+          </p:cNvSpPr>
+          <p:nvPr>
+            <p:ph type="title"/>
+          </p:nvPr>
+        </p:nvSpPr>
+        <p:spPr/>
+        <p:txBody>
+          <a:bodyPr/>
+          <a:lstStyle/>
+          <a:p>
+            <a:endParaRPr lang="en-US"/>
+          </a:p>
+        </p:txBody>
+      </p:sp>
+      <p:sp>
+        <p:nvSpPr>
+          <p:cNvPr id="3" name="Content Placeholder 2">
+            <a:extLst>
+              <a:ext uri="{FF2B5EF4-FFF2-40B4-BE49-F238E27FC236}">
+                <a16:creationId xmlns:a16="http://schemas.microsoft.com/office/drawing/2014/main" id="{C1E47498-9D6F-DF4B-A768-5EAE9ED47966}"/>
+              </a:ext>
+            </a:extLst>
+          </p:cNvPr>
+          <p:cNvSpPr>
+            <a:spLocks noGrp="1"/>
+          </p:cNvSpPr>
+          <p:nvPr>
+            <p:ph idx="1"/>
+          </p:nvPr>
+        </p:nvSpPr>
+        <p:spPr/>
+        <p:txBody>
+          <a:bodyPr/>
+          <a:lstStyle/>
+          <a:p>
+            <a:endParaRPr lang="en-US" dirty="0"/>
+          </a:p>
+        </p:txBody>
+      </p:sp>
+      <p:pic>
+        <p:nvPicPr>
+          <p:cNvPr id="4" name="Picture 3">
+            <a:extLst>
+              <a:ext uri="{FF2B5EF4-FFF2-40B4-BE49-F238E27FC236}">
+                <a16:creationId xmlns:a16="http://schemas.microsoft.com/office/drawing/2014/main" id="{191E27FA-A770-4D4D-9C5D-B392D316FF30}"/>
+              </a:ext>
+            </a:extLst>
+          </p:cNvPr>
+          <p:cNvPicPr>
+            <a:picLocks noChangeAspect="1"/>
+          </p:cNvPicPr>
+          <p:nvPr/>
+        </p:nvPicPr>
+        <p:blipFill>
+          <a:blip r:embed="rId2"/>
+          <a:srcRect/>
+          <a:stretch/>
+        </p:blipFill>
+        <p:spPr>
+          <a:xfrm>
+            <a:off x="4415837" y="3454592"/>
+            <a:ext cx="3107431" cy="3107431"/>
+          </a:xfrm>
+          <a:prstGeom prst="rect">
+            <a:avLst/>
+          </a:prstGeom>
+        </p:spPr>
+      </p:pic>
+      <p:pic>
+        <p:nvPicPr>
+          <p:cNvPr id="5" name="Picture 4">
+            <a:extLst>
+              <a:ext uri="{FF2B5EF4-FFF2-40B4-BE49-F238E27FC236}">
+                <a16:creationId xmlns:a16="http://schemas.microsoft.com/office/drawing/2014/main" id="{BAB902EB-18C1-DC4D-BC59-12AA868E5046}"/>
+              </a:ext>
+            </a:extLst>
+          </p:cNvPr>
+          <p:cNvPicPr>
+            <a:picLocks noChangeAspect="1"/>
+          </p:cNvPicPr>
+          <p:nvPr/>
+        </p:nvPicPr>
+        <p:blipFill>
+          <a:blip r:embed="rId3"/>
+          <a:srcRect/>
+          <a:stretch/>
+        </p:blipFill>
+        <p:spPr>
+          <a:xfrm>
+            <a:off x="1561303" y="372752"/>
+            <a:ext cx="3107431" cy="3107431"/>
+          </a:xfrm>
+          <a:prstGeom prst="rect">
+            <a:avLst/>
+          </a:prstGeom>
+        </p:spPr>
+      </p:pic>
+      <p:pic>
+        <p:nvPicPr>
+          <p:cNvPr id="6" name="Picture 5">
+            <a:extLst>
+              <a:ext uri="{FF2B5EF4-FFF2-40B4-BE49-F238E27FC236}">
+                <a16:creationId xmlns:a16="http://schemas.microsoft.com/office/drawing/2014/main" id="{C8F9E206-C36E-0D46-BC02-D542F3C36D53}"/>
+              </a:ext>
+            </a:extLst>
+          </p:cNvPr>
+          <p:cNvPicPr>
+            <a:picLocks noChangeAspect="1"/>
+          </p:cNvPicPr>
+          <p:nvPr/>
+        </p:nvPicPr>
+        <p:blipFill>
+          <a:blip r:embed="rId4"/>
+          <a:srcRect/>
+          <a:stretch/>
+        </p:blipFill>
+        <p:spPr>
+          <a:xfrm>
+            <a:off x="1561303" y="3429000"/>
+            <a:ext cx="3107431" cy="3107431"/>
+          </a:xfrm>
+          <a:prstGeom prst="rect">
+            <a:avLst/>
+          </a:prstGeom>
+        </p:spPr>
+      </p:pic>
+    </p:spTree>
+    <p:extLst>
+      <p:ext uri="{BB962C8B-B14F-4D97-AF65-F5344CB8AC3E}">
+        <p14:creationId xmlns:p14="http://schemas.microsoft.com/office/powerpoint/2010/main" val="2270670260"/>
+      </p:ext>
+    </p:extLst>
+  </p:cSld>
+  <p:clrMapOvr>
+    <a:masterClrMapping/>
+  </p:clrMapOvr>
+</p:sld>
+</file>
+
+<file path=ppt/slides/slide11.xml><?xml version="1.0" encoding="utf-8"?>
+<p:sld xmlns:a="http://schemas.openxmlformats.org/drawingml/2006/main" xmlns:r="http://schemas.openxmlformats.org/officeDocument/2006/relationships" xmlns:p="http://schemas.openxmlformats.org/presentationml/2006/main">
+  <p:cSld>
+    <p:spTree>
+      <p:nvGrpSpPr>
+        <p:cNvPr id="1" name=""/>
+        <p:cNvGrpSpPr/>
+        <p:nvPr/>
+      </p:nvGrpSpPr>
+      <p:grpSpPr>
+        <a:xfrm>
+          <a:off x="0" y="0"/>
+          <a:ext cx="0" cy="0"/>
+          <a:chOff x="0" y="0"/>
+          <a:chExt cx="0" cy="0"/>
+        </a:xfrm>
+      </p:grpSpPr>
+      <p:sp>
+        <p:nvSpPr>
+          <p:cNvPr id="2" name="Title 1">
+            <a:extLst>
+              <a:ext uri="{FF2B5EF4-FFF2-40B4-BE49-F238E27FC236}">
+                <a16:creationId xmlns:a16="http://schemas.microsoft.com/office/drawing/2014/main" id="{2158FDC7-10D5-E142-8149-947DED87180F}"/>
+              </a:ext>
+            </a:extLst>
+          </p:cNvPr>
+          <p:cNvSpPr>
+            <a:spLocks noGrp="1"/>
+          </p:cNvSpPr>
+          <p:nvPr>
+            <p:ph type="title"/>
+          </p:nvPr>
+        </p:nvSpPr>
+        <p:spPr/>
+        <p:txBody>
+          <a:bodyPr/>
+          <a:lstStyle/>
+          <a:p>
+            <a:endParaRPr lang="en-US"/>
+          </a:p>
+        </p:txBody>
+      </p:sp>
+      <p:sp>
+        <p:nvSpPr>
+          <p:cNvPr id="3" name="Content Placeholder 2">
+            <a:extLst>
+              <a:ext uri="{FF2B5EF4-FFF2-40B4-BE49-F238E27FC236}">
+                <a16:creationId xmlns:a16="http://schemas.microsoft.com/office/drawing/2014/main" id="{C1E47498-9D6F-DF4B-A768-5EAE9ED47966}"/>
+              </a:ext>
+            </a:extLst>
+          </p:cNvPr>
+          <p:cNvSpPr>
+            <a:spLocks noGrp="1"/>
+          </p:cNvSpPr>
+          <p:nvPr>
+            <p:ph idx="1"/>
+          </p:nvPr>
+        </p:nvSpPr>
+        <p:spPr/>
+        <p:txBody>
+          <a:bodyPr/>
+          <a:lstStyle/>
+          <a:p>
+            <a:endParaRPr lang="en-US" dirty="0"/>
+          </a:p>
+        </p:txBody>
+      </p:sp>
+      <p:pic>
+        <p:nvPicPr>
+          <p:cNvPr id="4" name="Picture 3">
+            <a:extLst>
+              <a:ext uri="{FF2B5EF4-FFF2-40B4-BE49-F238E27FC236}">
+                <a16:creationId xmlns:a16="http://schemas.microsoft.com/office/drawing/2014/main" id="{191E27FA-A770-4D4D-9C5D-B392D316FF30}"/>
+              </a:ext>
+            </a:extLst>
+          </p:cNvPr>
+          <p:cNvPicPr>
+            <a:picLocks noChangeAspect="1"/>
+          </p:cNvPicPr>
+          <p:nvPr/>
+        </p:nvPicPr>
+        <p:blipFill>
+          <a:blip r:embed="rId2"/>
+          <a:srcRect/>
+          <a:stretch/>
+        </p:blipFill>
+        <p:spPr>
+          <a:xfrm>
+            <a:off x="6701837" y="3069532"/>
+            <a:ext cx="3107431" cy="3107431"/>
+          </a:xfrm>
+          <a:prstGeom prst="rect">
+            <a:avLst/>
+          </a:prstGeom>
+        </p:spPr>
+      </p:pic>
+      <p:pic>
+        <p:nvPicPr>
+          <p:cNvPr id="5" name="Picture 4">
+            <a:extLst>
+              <a:ext uri="{FF2B5EF4-FFF2-40B4-BE49-F238E27FC236}">
+                <a16:creationId xmlns:a16="http://schemas.microsoft.com/office/drawing/2014/main" id="{BAB902EB-18C1-DC4D-BC59-12AA868E5046}"/>
+              </a:ext>
+            </a:extLst>
+          </p:cNvPr>
+          <p:cNvPicPr>
+            <a:picLocks noChangeAspect="1"/>
+          </p:cNvPicPr>
+          <p:nvPr/>
+        </p:nvPicPr>
+        <p:blipFill>
+          <a:blip r:embed="rId3"/>
+          <a:srcRect/>
+          <a:stretch/>
+        </p:blipFill>
+        <p:spPr>
+          <a:xfrm>
+            <a:off x="1561303" y="372752"/>
+            <a:ext cx="3107431" cy="3107431"/>
+          </a:xfrm>
+          <a:prstGeom prst="rect">
+            <a:avLst/>
+          </a:prstGeom>
+        </p:spPr>
+      </p:pic>
+      <p:pic>
+        <p:nvPicPr>
+          <p:cNvPr id="6" name="Picture 5">
+            <a:extLst>
+              <a:ext uri="{FF2B5EF4-FFF2-40B4-BE49-F238E27FC236}">
+                <a16:creationId xmlns:a16="http://schemas.microsoft.com/office/drawing/2014/main" id="{C8F9E206-C36E-0D46-BC02-D542F3C36D53}"/>
+              </a:ext>
+            </a:extLst>
+          </p:cNvPr>
+          <p:cNvPicPr>
+            <a:picLocks noChangeAspect="1"/>
+          </p:cNvPicPr>
+          <p:nvPr/>
+        </p:nvPicPr>
+        <p:blipFill>
+          <a:blip r:embed="rId4"/>
+          <a:srcRect/>
+          <a:stretch/>
+        </p:blipFill>
+        <p:spPr>
+          <a:xfrm>
+            <a:off x="1561303" y="3429000"/>
+            <a:ext cx="3107431" cy="3107431"/>
+          </a:xfrm>
+          <a:prstGeom prst="rect">
+            <a:avLst/>
+          </a:prstGeom>
+        </p:spPr>
+      </p:pic>
+    </p:spTree>
+    <p:extLst>
+      <p:ext uri="{BB962C8B-B14F-4D97-AF65-F5344CB8AC3E}">
+        <p14:creationId xmlns:p14="http://schemas.microsoft.com/office/powerpoint/2010/main" val="122889096"/>
+      </p:ext>
+    </p:extLst>
+  </p:cSld>
+  <p:clrMapOvr>
+    <a:masterClrMapping/>
+  </p:clrMapOvr>
+</p:sld>
+</file>
+
 <file path=ppt/slides/slide2.xml><?xml version="1.0" encoding="utf-8"?>
+<p:sld xmlns:a="http://schemas.openxmlformats.org/drawingml/2006/main" xmlns:r="http://schemas.openxmlformats.org/officeDocument/2006/relationships" xmlns:p="http://schemas.openxmlformats.org/presentationml/2006/main">
+  <p:cSld>
+    <p:spTree>
+      <p:nvGrpSpPr>
+        <p:cNvPr id="1" name=""/>
+        <p:cNvGrpSpPr/>
+        <p:nvPr/>
+      </p:nvGrpSpPr>
+      <p:grpSpPr>
+        <a:xfrm>
+          <a:off x="0" y="0"/>
+          <a:ext cx="0" cy="0"/>
+          <a:chOff x="0" y="0"/>
+          <a:chExt cx="0" cy="0"/>
+        </a:xfrm>
+      </p:grpSpPr>
+      <p:grpSp>
+        <p:nvGrpSpPr>
+          <p:cNvPr id="18" name="Group 17">
+            <a:extLst>
+              <a:ext uri="{FF2B5EF4-FFF2-40B4-BE49-F238E27FC236}">
+                <a16:creationId xmlns:a16="http://schemas.microsoft.com/office/drawing/2014/main" id="{401A4F7E-00B9-C548-9723-855EC48ED25D}"/>
+              </a:ext>
+            </a:extLst>
+          </p:cNvPr>
+          <p:cNvGrpSpPr/>
+          <p:nvPr/>
+        </p:nvGrpSpPr>
+        <p:grpSpPr>
+          <a:xfrm>
+            <a:off x="1639956" y="334364"/>
+            <a:ext cx="9148009" cy="6189271"/>
+            <a:chOff x="1126879" y="372752"/>
+            <a:chExt cx="9148009" cy="6189271"/>
+          </a:xfrm>
+        </p:grpSpPr>
+        <p:grpSp>
+          <p:nvGrpSpPr>
+            <p:cNvPr id="4" name="Group 3">
+              <a:extLst>
+                <a:ext uri="{FF2B5EF4-FFF2-40B4-BE49-F238E27FC236}">
+                  <a16:creationId xmlns:a16="http://schemas.microsoft.com/office/drawing/2014/main" id="{CAD755C1-5733-C141-914B-8CABF53650D5}"/>
+                </a:ext>
+              </a:extLst>
+            </p:cNvPr>
+            <p:cNvGrpSpPr/>
+            <p:nvPr/>
+          </p:nvGrpSpPr>
+          <p:grpSpPr>
+            <a:xfrm>
+              <a:off x="1561303" y="372752"/>
+              <a:ext cx="8713585" cy="6189271"/>
+              <a:chOff x="-165421" y="-41467"/>
+              <a:chExt cx="8713585" cy="6189271"/>
+            </a:xfrm>
+          </p:grpSpPr>
+          <p:pic>
+            <p:nvPicPr>
+              <p:cNvPr id="6" name="Picture 5">
+                <a:extLst>
+                  <a:ext uri="{FF2B5EF4-FFF2-40B4-BE49-F238E27FC236}">
+                    <a16:creationId xmlns:a16="http://schemas.microsoft.com/office/drawing/2014/main" id="{2FC9B667-1CEB-BA4F-BA2D-79032FA6C50B}"/>
+                  </a:ext>
+                </a:extLst>
+              </p:cNvPr>
+              <p:cNvPicPr>
+                <a:picLocks noChangeAspect="1"/>
+              </p:cNvPicPr>
+              <p:nvPr/>
+            </p:nvPicPr>
+            <p:blipFill>
+              <a:blip r:embed="rId2"/>
+              <a:srcRect/>
+              <a:stretch/>
+            </p:blipFill>
+            <p:spPr>
+              <a:xfrm>
+                <a:off x="5547123" y="39332"/>
+                <a:ext cx="3001041" cy="3001041"/>
+              </a:xfrm>
+              <a:prstGeom prst="rect">
+                <a:avLst/>
+              </a:prstGeom>
+            </p:spPr>
+          </p:pic>
+          <p:pic>
+            <p:nvPicPr>
+              <p:cNvPr id="5" name="Picture 4">
+                <a:extLst>
+                  <a:ext uri="{FF2B5EF4-FFF2-40B4-BE49-F238E27FC236}">
+                    <a16:creationId xmlns:a16="http://schemas.microsoft.com/office/drawing/2014/main" id="{329A1794-C354-2340-900A-66C05C81C534}"/>
+                  </a:ext>
+                </a:extLst>
+              </p:cNvPr>
+              <p:cNvPicPr>
+                <a:picLocks noChangeAspect="1"/>
+              </p:cNvPicPr>
+              <p:nvPr/>
+            </p:nvPicPr>
+            <p:blipFill>
+              <a:blip r:embed="rId3"/>
+              <a:srcRect/>
+              <a:stretch/>
+            </p:blipFill>
+            <p:spPr>
+              <a:xfrm>
+                <a:off x="2689113" y="-41467"/>
+                <a:ext cx="3107431" cy="3107431"/>
+              </a:xfrm>
+              <a:prstGeom prst="rect">
+                <a:avLst/>
+              </a:prstGeom>
+            </p:spPr>
+          </p:pic>
+          <p:pic>
+            <p:nvPicPr>
+              <p:cNvPr id="8" name="Picture 7">
+                <a:extLst>
+                  <a:ext uri="{FF2B5EF4-FFF2-40B4-BE49-F238E27FC236}">
+                    <a16:creationId xmlns:a16="http://schemas.microsoft.com/office/drawing/2014/main" id="{0D17157D-EB3F-0E47-9B58-C25A93899787}"/>
+                  </a:ext>
+                </a:extLst>
+              </p:cNvPr>
+              <p:cNvPicPr>
+                <a:picLocks noChangeAspect="1"/>
+              </p:cNvPicPr>
+              <p:nvPr/>
+            </p:nvPicPr>
+            <p:blipFill>
+              <a:blip r:embed="rId4"/>
+              <a:srcRect/>
+              <a:stretch/>
+            </p:blipFill>
+            <p:spPr>
+              <a:xfrm>
+                <a:off x="2689113" y="3040373"/>
+                <a:ext cx="3107431" cy="3107431"/>
+              </a:xfrm>
+              <a:prstGeom prst="rect">
+                <a:avLst/>
+              </a:prstGeom>
+            </p:spPr>
+          </p:pic>
+          <p:pic>
+            <p:nvPicPr>
+              <p:cNvPr id="9" name="Picture 8">
+                <a:extLst>
+                  <a:ext uri="{FF2B5EF4-FFF2-40B4-BE49-F238E27FC236}">
+                    <a16:creationId xmlns:a16="http://schemas.microsoft.com/office/drawing/2014/main" id="{B6737816-30AD-3B4B-89F9-CA950E80191C}"/>
+                  </a:ext>
+                </a:extLst>
+              </p:cNvPr>
+              <p:cNvPicPr>
+                <a:picLocks noChangeAspect="1"/>
+              </p:cNvPicPr>
+              <p:nvPr/>
+            </p:nvPicPr>
+            <p:blipFill>
+              <a:blip r:embed="rId5"/>
+              <a:srcRect/>
+              <a:stretch/>
+            </p:blipFill>
+            <p:spPr>
+              <a:xfrm>
+                <a:off x="-165421" y="-41467"/>
+                <a:ext cx="3107431" cy="3107431"/>
+              </a:xfrm>
+              <a:prstGeom prst="rect">
+                <a:avLst/>
+              </a:prstGeom>
+            </p:spPr>
+          </p:pic>
+        </p:grpSp>
+        <p:sp>
+          <p:nvSpPr>
+            <p:cNvPr id="10" name="Rectangle 9">
+              <a:extLst>
+                <a:ext uri="{FF2B5EF4-FFF2-40B4-BE49-F238E27FC236}">
+                  <a16:creationId xmlns:a16="http://schemas.microsoft.com/office/drawing/2014/main" id="{AE4C4DB9-C597-C847-A93B-CBD9BCF3261F}"/>
+                </a:ext>
+              </a:extLst>
+            </p:cNvPr>
+            <p:cNvSpPr/>
+            <p:nvPr/>
+          </p:nvSpPr>
+          <p:spPr>
+            <a:xfrm>
+              <a:off x="1441174" y="1351722"/>
+              <a:ext cx="198783" cy="983974"/>
+            </a:xfrm>
+            <a:prstGeom prst="rect">
+              <a:avLst/>
+            </a:prstGeom>
+            <a:solidFill>
+              <a:schemeClr val="bg1"/>
+            </a:solidFill>
+            <a:ln>
+              <a:noFill/>
+            </a:ln>
+          </p:spPr>
+          <p:style>
+            <a:lnRef idx="2">
+              <a:schemeClr val="accent1">
+                <a:shade val="50000"/>
+              </a:schemeClr>
+            </a:lnRef>
+            <a:fillRef idx="1">
+              <a:schemeClr val="accent1"/>
+            </a:fillRef>
+            <a:effectRef idx="0">
+              <a:schemeClr val="accent1"/>
+            </a:effectRef>
+            <a:fontRef idx="minor">
+              <a:schemeClr val="lt1"/>
+            </a:fontRef>
+          </p:style>
+          <p:txBody>
+            <a:bodyPr rtlCol="0" anchor="ctr"/>
+            <a:lstStyle/>
+            <a:p>
+              <a:pPr algn="ctr"/>
+              <a:endParaRPr lang="en-US"/>
+            </a:p>
+          </p:txBody>
+        </p:sp>
+        <p:sp>
+          <p:nvSpPr>
+            <p:cNvPr id="11" name="Rectangle 10">
+              <a:extLst>
+                <a:ext uri="{FF2B5EF4-FFF2-40B4-BE49-F238E27FC236}">
+                  <a16:creationId xmlns:a16="http://schemas.microsoft.com/office/drawing/2014/main" id="{D03BE2D2-50E2-8B4F-B09E-E42E6C326DAA}"/>
+                </a:ext>
+              </a:extLst>
+            </p:cNvPr>
+            <p:cNvSpPr/>
+            <p:nvPr/>
+          </p:nvSpPr>
+          <p:spPr>
+            <a:xfrm>
+              <a:off x="1465434" y="4490728"/>
+              <a:ext cx="198783" cy="983974"/>
+            </a:xfrm>
+            <a:prstGeom prst="rect">
+              <a:avLst/>
+            </a:prstGeom>
+            <a:solidFill>
+              <a:schemeClr val="bg1"/>
+            </a:solidFill>
+            <a:ln>
+              <a:noFill/>
+            </a:ln>
+          </p:spPr>
+          <p:style>
+            <a:lnRef idx="2">
+              <a:schemeClr val="accent1">
+                <a:shade val="50000"/>
+              </a:schemeClr>
+            </a:lnRef>
+            <a:fillRef idx="1">
+              <a:schemeClr val="accent1"/>
+            </a:fillRef>
+            <a:effectRef idx="0">
+              <a:schemeClr val="accent1"/>
+            </a:effectRef>
+            <a:fontRef idx="minor">
+              <a:schemeClr val="lt1"/>
+            </a:fontRef>
+          </p:style>
+          <p:txBody>
+            <a:bodyPr rtlCol="0" anchor="ctr"/>
+            <a:lstStyle/>
+            <a:p>
+              <a:pPr algn="ctr"/>
+              <a:endParaRPr lang="en-US"/>
+            </a:p>
+          </p:txBody>
+        </p:sp>
+        <p:sp>
+          <p:nvSpPr>
+            <p:cNvPr id="12" name="TextBox 11">
+              <a:extLst>
+                <a:ext uri="{FF2B5EF4-FFF2-40B4-BE49-F238E27FC236}">
+                  <a16:creationId xmlns:a16="http://schemas.microsoft.com/office/drawing/2014/main" id="{4D59BA42-0CDF-3945-8CCB-3EA6F8F6E618}"/>
+                </a:ext>
+              </a:extLst>
+            </p:cNvPr>
+            <p:cNvSpPr txBox="1"/>
+            <p:nvPr/>
+          </p:nvSpPr>
+          <p:spPr>
+            <a:xfrm rot="16200000">
+              <a:off x="793134" y="3326294"/>
+              <a:ext cx="975267" cy="307777"/>
+            </a:xfrm>
+            <a:prstGeom prst="rect">
+              <a:avLst/>
+            </a:prstGeom>
+            <a:noFill/>
+          </p:spPr>
+          <p:txBody>
+            <a:bodyPr wrap="none" rtlCol="0">
+              <a:spAutoFit/>
+            </a:bodyPr>
+            <a:lstStyle/>
+            <a:p>
+              <a:r>
+                <a:rPr lang="en-US" sz="1400" dirty="0"/>
+                <a:t>Probability</a:t>
+              </a:r>
+            </a:p>
+          </p:txBody>
+        </p:sp>
+        <p:sp>
+          <p:nvSpPr>
+            <p:cNvPr id="13" name="TextBox 12">
+              <a:extLst>
+                <a:ext uri="{FF2B5EF4-FFF2-40B4-BE49-F238E27FC236}">
+                  <a16:creationId xmlns:a16="http://schemas.microsoft.com/office/drawing/2014/main" id="{C441D8C3-6719-BA40-962C-DAD764F480AB}"/>
+                </a:ext>
+              </a:extLst>
+            </p:cNvPr>
+            <p:cNvSpPr txBox="1"/>
+            <p:nvPr/>
+          </p:nvSpPr>
+          <p:spPr>
+            <a:xfrm>
+              <a:off x="1195497" y="492905"/>
+              <a:ext cx="365806" cy="369332"/>
+            </a:xfrm>
+            <a:prstGeom prst="rect">
+              <a:avLst/>
+            </a:prstGeom>
+            <a:noFill/>
+          </p:spPr>
+          <p:txBody>
+            <a:bodyPr wrap="none" rtlCol="0">
+              <a:spAutoFit/>
+            </a:bodyPr>
+            <a:lstStyle/>
+            <a:p>
+              <a:r>
+                <a:rPr lang="en-US" dirty="0"/>
+                <a:t>a)</a:t>
+              </a:r>
+            </a:p>
+          </p:txBody>
+        </p:sp>
+        <p:sp>
+          <p:nvSpPr>
+            <p:cNvPr id="14" name="TextBox 13">
+              <a:extLst>
+                <a:ext uri="{FF2B5EF4-FFF2-40B4-BE49-F238E27FC236}">
+                  <a16:creationId xmlns:a16="http://schemas.microsoft.com/office/drawing/2014/main" id="{A2390D67-466D-AC45-B7D4-58974899ADAA}"/>
+                </a:ext>
+              </a:extLst>
+            </p:cNvPr>
+            <p:cNvSpPr txBox="1"/>
+            <p:nvPr/>
+          </p:nvSpPr>
+          <p:spPr>
+            <a:xfrm>
+              <a:off x="4232934" y="492905"/>
+              <a:ext cx="377026" cy="369332"/>
+            </a:xfrm>
+            <a:prstGeom prst="rect">
+              <a:avLst/>
+            </a:prstGeom>
+            <a:noFill/>
+          </p:spPr>
+          <p:txBody>
+            <a:bodyPr wrap="none" rtlCol="0">
+              <a:spAutoFit/>
+            </a:bodyPr>
+            <a:lstStyle/>
+            <a:p>
+              <a:r>
+                <a:rPr lang="en-US" dirty="0"/>
+                <a:t>b)</a:t>
+              </a:r>
+            </a:p>
+          </p:txBody>
+        </p:sp>
+        <p:sp>
+          <p:nvSpPr>
+            <p:cNvPr id="15" name="TextBox 14">
+              <a:extLst>
+                <a:ext uri="{FF2B5EF4-FFF2-40B4-BE49-F238E27FC236}">
+                  <a16:creationId xmlns:a16="http://schemas.microsoft.com/office/drawing/2014/main" id="{A06CB4E2-A3CA-804D-B962-E01A40064ACB}"/>
+                </a:ext>
+              </a:extLst>
+            </p:cNvPr>
+            <p:cNvSpPr txBox="1"/>
+            <p:nvPr/>
+          </p:nvSpPr>
+          <p:spPr>
+            <a:xfrm>
+              <a:off x="7095880" y="499111"/>
+              <a:ext cx="352982" cy="369332"/>
+            </a:xfrm>
+            <a:prstGeom prst="rect">
+              <a:avLst/>
+            </a:prstGeom>
+            <a:noFill/>
+          </p:spPr>
+          <p:txBody>
+            <a:bodyPr wrap="none" rtlCol="0">
+              <a:spAutoFit/>
+            </a:bodyPr>
+            <a:lstStyle/>
+            <a:p>
+              <a:r>
+                <a:rPr lang="en-US" dirty="0"/>
+                <a:t>c)</a:t>
+              </a:r>
+            </a:p>
+          </p:txBody>
+        </p:sp>
+        <p:sp>
+          <p:nvSpPr>
+            <p:cNvPr id="16" name="TextBox 15">
+              <a:extLst>
+                <a:ext uri="{FF2B5EF4-FFF2-40B4-BE49-F238E27FC236}">
+                  <a16:creationId xmlns:a16="http://schemas.microsoft.com/office/drawing/2014/main" id="{0B187B8A-6A24-9F4A-AB35-F79D4D712451}"/>
+                </a:ext>
+              </a:extLst>
+            </p:cNvPr>
+            <p:cNvSpPr txBox="1"/>
+            <p:nvPr/>
+          </p:nvSpPr>
+          <p:spPr>
+            <a:xfrm>
+              <a:off x="1323942" y="3611281"/>
+              <a:ext cx="377026" cy="369332"/>
+            </a:xfrm>
+            <a:prstGeom prst="rect">
+              <a:avLst/>
+            </a:prstGeom>
+            <a:noFill/>
+          </p:spPr>
+          <p:txBody>
+            <a:bodyPr wrap="none" rtlCol="0">
+              <a:spAutoFit/>
+            </a:bodyPr>
+            <a:lstStyle/>
+            <a:p>
+              <a:r>
+                <a:rPr lang="en-US" dirty="0"/>
+                <a:t>d)</a:t>
+              </a:r>
+            </a:p>
+          </p:txBody>
+        </p:sp>
+        <p:sp>
+          <p:nvSpPr>
+            <p:cNvPr id="17" name="TextBox 16">
+              <a:extLst>
+                <a:ext uri="{FF2B5EF4-FFF2-40B4-BE49-F238E27FC236}">
+                  <a16:creationId xmlns:a16="http://schemas.microsoft.com/office/drawing/2014/main" id="{470EDF46-DC31-934C-B8F4-9339E057D300}"/>
+                </a:ext>
+              </a:extLst>
+            </p:cNvPr>
+            <p:cNvSpPr txBox="1"/>
+            <p:nvPr/>
+          </p:nvSpPr>
+          <p:spPr>
+            <a:xfrm>
+              <a:off x="4232934" y="3598485"/>
+              <a:ext cx="370614" cy="369332"/>
+            </a:xfrm>
+            <a:prstGeom prst="rect">
+              <a:avLst/>
+            </a:prstGeom>
+            <a:noFill/>
+          </p:spPr>
+          <p:txBody>
+            <a:bodyPr wrap="none" rtlCol="0">
+              <a:spAutoFit/>
+            </a:bodyPr>
+            <a:lstStyle/>
+            <a:p>
+              <a:r>
+                <a:rPr lang="en-US" dirty="0"/>
+                <a:t>e)</a:t>
+              </a:r>
+            </a:p>
+          </p:txBody>
+        </p:sp>
+      </p:grpSp>
+      <p:pic>
+        <p:nvPicPr>
+          <p:cNvPr id="20" name="Picture 19" descr="Chart, line chart&#10;&#10;Description automatically generated">
+            <a:extLst>
+              <a:ext uri="{FF2B5EF4-FFF2-40B4-BE49-F238E27FC236}">
+                <a16:creationId xmlns:a16="http://schemas.microsoft.com/office/drawing/2014/main" id="{4AFCAF98-843D-5643-A85F-6709B6CDCDCB}"/>
+              </a:ext>
+            </a:extLst>
+          </p:cNvPr>
+          <p:cNvPicPr>
+            <a:picLocks noChangeAspect="1"/>
+          </p:cNvPicPr>
+          <p:nvPr/>
+        </p:nvPicPr>
+        <p:blipFill>
+          <a:blip r:embed="rId6"/>
+          <a:stretch>
+            <a:fillRect/>
+          </a:stretch>
+        </p:blipFill>
+        <p:spPr>
+          <a:xfrm>
+            <a:off x="1884418" y="3651411"/>
+            <a:ext cx="3487353" cy="2789882"/>
+          </a:xfrm>
+          <a:prstGeom prst="rect">
+            <a:avLst/>
+          </a:prstGeom>
+        </p:spPr>
+      </p:pic>
+    </p:spTree>
+    <p:extLst>
+      <p:ext uri="{BB962C8B-B14F-4D97-AF65-F5344CB8AC3E}">
+        <p14:creationId xmlns:p14="http://schemas.microsoft.com/office/powerpoint/2010/main" val="3769621700"/>
+      </p:ext>
+    </p:extLst>
+  </p:cSld>
+  <p:clrMapOvr>
+    <a:masterClrMapping/>
+  </p:clrMapOvr>
+</p:sld>
+</file>
+
+<file path=ppt/slides/slide3.xml><?xml version="1.0" encoding="utf-8"?>
 <p:sld xmlns:a="http://schemas.openxmlformats.org/drawingml/2006/main" xmlns:r="http://schemas.openxmlformats.org/officeDocument/2006/relationships" xmlns:p="http://schemas.openxmlformats.org/presentationml/2006/main">
   <p:cSld>
     <p:spTree>
@@ -4153,7 +5026,7 @@
 </p:sld>
 </file>
 
-<file path=ppt/slides/slide3.xml><?xml version="1.0" encoding="utf-8"?>
+<file path=ppt/slides/slide4.xml><?xml version="1.0" encoding="utf-8"?>
 <p:sld xmlns:a="http://schemas.openxmlformats.org/drawingml/2006/main" xmlns:r="http://schemas.openxmlformats.org/officeDocument/2006/relationships" xmlns:p="http://schemas.openxmlformats.org/presentationml/2006/main">
   <p:cSld>
     <p:spTree>
@@ -4185,9 +5058,9 @@
         <p:grpSpPr>
           <a:xfrm>
             <a:off x="1463932" y="1524000"/>
-            <a:ext cx="8448590" cy="3810000"/>
+            <a:ext cx="9077068" cy="3810000"/>
             <a:chOff x="1463932" y="1524000"/>
-            <a:chExt cx="8448590" cy="3810000"/>
+            <a:chExt cx="9077068" cy="3810000"/>
           </a:xfrm>
         </p:grpSpPr>
         <p:pic>
@@ -4211,7 +5084,7 @@
           </p:blipFill>
           <p:spPr>
             <a:xfrm>
-              <a:off x="5467522" y="1524000"/>
+              <a:off x="6096000" y="1524000"/>
               <a:ext cx="4445000" cy="3810000"/>
             </a:xfrm>
             <a:prstGeom prst="rect">
@@ -4332,7 +5205,689 @@
 </p:sld>
 </file>
 
-<file path=ppt/slides/slide4.xml><?xml version="1.0" encoding="utf-8"?>
+<file path=ppt/slides/slide5.xml><?xml version="1.0" encoding="utf-8"?>
+<p:sld xmlns:a="http://schemas.openxmlformats.org/drawingml/2006/main" xmlns:r="http://schemas.openxmlformats.org/officeDocument/2006/relationships" xmlns:p="http://schemas.openxmlformats.org/presentationml/2006/main">
+  <p:cSld>
+    <p:spTree>
+      <p:nvGrpSpPr>
+        <p:cNvPr id="1" name=""/>
+        <p:cNvGrpSpPr/>
+        <p:nvPr/>
+      </p:nvGrpSpPr>
+      <p:grpSpPr>
+        <a:xfrm>
+          <a:off x="0" y="0"/>
+          <a:ext cx="0" cy="0"/>
+          <a:chOff x="0" y="0"/>
+          <a:chExt cx="0" cy="0"/>
+        </a:xfrm>
+      </p:grpSpPr>
+      <p:grpSp>
+        <p:nvGrpSpPr>
+          <p:cNvPr id="10" name="Group 9">
+            <a:extLst>
+              <a:ext uri="{FF2B5EF4-FFF2-40B4-BE49-F238E27FC236}">
+                <a16:creationId xmlns:a16="http://schemas.microsoft.com/office/drawing/2014/main" id="{41191D86-EC28-E74F-BA1C-4E9F597D11F6}"/>
+              </a:ext>
+            </a:extLst>
+          </p:cNvPr>
+          <p:cNvGrpSpPr/>
+          <p:nvPr/>
+        </p:nvGrpSpPr>
+        <p:grpSpPr>
+          <a:xfrm>
+            <a:off x="1463932" y="1524000"/>
+            <a:ext cx="9077068" cy="3757083"/>
+            <a:chOff x="1463932" y="1524000"/>
+            <a:chExt cx="9077068" cy="3757083"/>
+          </a:xfrm>
+        </p:grpSpPr>
+        <p:pic>
+          <p:nvPicPr>
+            <p:cNvPr id="5" name="Picture 4">
+              <a:extLst>
+                <a:ext uri="{FF2B5EF4-FFF2-40B4-BE49-F238E27FC236}">
+                  <a16:creationId xmlns:a16="http://schemas.microsoft.com/office/drawing/2014/main" id="{A095807B-7741-D64C-A5E5-391639F83B75}"/>
+                </a:ext>
+              </a:extLst>
+            </p:cNvPr>
+            <p:cNvPicPr>
+              <a:picLocks noChangeAspect="1"/>
+            </p:cNvPicPr>
+            <p:nvPr/>
+          </p:nvPicPr>
+          <p:blipFill>
+            <a:blip r:embed="rId2"/>
+            <a:srcRect/>
+            <a:stretch/>
+          </p:blipFill>
+          <p:spPr>
+            <a:xfrm>
+              <a:off x="6096000" y="1576917"/>
+              <a:ext cx="4445000" cy="3704166"/>
+            </a:xfrm>
+            <a:prstGeom prst="rect">
+              <a:avLst/>
+            </a:prstGeom>
+          </p:spPr>
+        </p:pic>
+        <p:pic>
+          <p:nvPicPr>
+            <p:cNvPr id="7" name="Picture 6">
+              <a:extLst>
+                <a:ext uri="{FF2B5EF4-FFF2-40B4-BE49-F238E27FC236}">
+                  <a16:creationId xmlns:a16="http://schemas.microsoft.com/office/drawing/2014/main" id="{B2220DDB-1D9B-AA46-BE15-061C8A74AD67}"/>
+                </a:ext>
+              </a:extLst>
+            </p:cNvPr>
+            <p:cNvPicPr>
+              <a:picLocks noChangeAspect="1"/>
+            </p:cNvPicPr>
+            <p:nvPr/>
+          </p:nvPicPr>
+          <p:blipFill>
+            <a:blip r:embed="rId3"/>
+            <a:srcRect/>
+            <a:stretch/>
+          </p:blipFill>
+          <p:spPr>
+            <a:xfrm>
+              <a:off x="1557466" y="1576917"/>
+              <a:ext cx="4445000" cy="3704166"/>
+            </a:xfrm>
+            <a:prstGeom prst="rect">
+              <a:avLst/>
+            </a:prstGeom>
+          </p:spPr>
+        </p:pic>
+        <p:sp>
+          <p:nvSpPr>
+            <p:cNvPr id="8" name="TextBox 7">
+              <a:extLst>
+                <a:ext uri="{FF2B5EF4-FFF2-40B4-BE49-F238E27FC236}">
+                  <a16:creationId xmlns:a16="http://schemas.microsoft.com/office/drawing/2014/main" id="{A2198951-9881-E543-AD5A-B544C0B75082}"/>
+                </a:ext>
+              </a:extLst>
+            </p:cNvPr>
+            <p:cNvSpPr txBox="1"/>
+            <p:nvPr/>
+          </p:nvSpPr>
+          <p:spPr>
+            <a:xfrm>
+              <a:off x="1463932" y="1524000"/>
+              <a:ext cx="365806" cy="369332"/>
+            </a:xfrm>
+            <a:prstGeom prst="rect">
+              <a:avLst/>
+            </a:prstGeom>
+            <a:noFill/>
+          </p:spPr>
+          <p:txBody>
+            <a:bodyPr wrap="none" rtlCol="0">
+              <a:spAutoFit/>
+            </a:bodyPr>
+            <a:lstStyle/>
+            <a:p>
+              <a:r>
+                <a:rPr lang="en-US" dirty="0"/>
+                <a:t>a)</a:t>
+              </a:r>
+            </a:p>
+          </p:txBody>
+        </p:sp>
+        <p:sp>
+          <p:nvSpPr>
+            <p:cNvPr id="9" name="TextBox 8">
+              <a:extLst>
+                <a:ext uri="{FF2B5EF4-FFF2-40B4-BE49-F238E27FC236}">
+                  <a16:creationId xmlns:a16="http://schemas.microsoft.com/office/drawing/2014/main" id="{63A1D4F4-BF69-A34D-A373-C842D00BC3D3}"/>
+                </a:ext>
+              </a:extLst>
+            </p:cNvPr>
+            <p:cNvSpPr txBox="1"/>
+            <p:nvPr/>
+          </p:nvSpPr>
+          <p:spPr>
+            <a:xfrm>
+              <a:off x="5531906" y="1524000"/>
+              <a:ext cx="377026" cy="369332"/>
+            </a:xfrm>
+            <a:prstGeom prst="rect">
+              <a:avLst/>
+            </a:prstGeom>
+            <a:noFill/>
+          </p:spPr>
+          <p:txBody>
+            <a:bodyPr wrap="none" rtlCol="0">
+              <a:spAutoFit/>
+            </a:bodyPr>
+            <a:lstStyle/>
+            <a:p>
+              <a:r>
+                <a:rPr lang="en-US" dirty="0"/>
+                <a:t>b)</a:t>
+              </a:r>
+            </a:p>
+          </p:txBody>
+        </p:sp>
+      </p:grpSp>
+    </p:spTree>
+    <p:extLst>
+      <p:ext uri="{BB962C8B-B14F-4D97-AF65-F5344CB8AC3E}">
+        <p14:creationId xmlns:p14="http://schemas.microsoft.com/office/powerpoint/2010/main" val="3988826083"/>
+      </p:ext>
+    </p:extLst>
+  </p:cSld>
+  <p:clrMapOvr>
+    <a:masterClrMapping/>
+  </p:clrMapOvr>
+</p:sld>
+</file>
+
+<file path=ppt/slides/slide6.xml><?xml version="1.0" encoding="utf-8"?>
+<p:sld xmlns:a="http://schemas.openxmlformats.org/drawingml/2006/main" xmlns:r="http://schemas.openxmlformats.org/officeDocument/2006/relationships" xmlns:p="http://schemas.openxmlformats.org/presentationml/2006/main">
+  <p:cSld>
+    <p:spTree>
+      <p:nvGrpSpPr>
+        <p:cNvPr id="1" name=""/>
+        <p:cNvGrpSpPr/>
+        <p:nvPr/>
+      </p:nvGrpSpPr>
+      <p:grpSpPr>
+        <a:xfrm>
+          <a:off x="0" y="0"/>
+          <a:ext cx="0" cy="0"/>
+          <a:chOff x="0" y="0"/>
+          <a:chExt cx="0" cy="0"/>
+        </a:xfrm>
+      </p:grpSpPr>
+      <p:grpSp>
+        <p:nvGrpSpPr>
+          <p:cNvPr id="10" name="Group 9">
+            <a:extLst>
+              <a:ext uri="{FF2B5EF4-FFF2-40B4-BE49-F238E27FC236}">
+                <a16:creationId xmlns:a16="http://schemas.microsoft.com/office/drawing/2014/main" id="{41191D86-EC28-E74F-BA1C-4E9F597D11F6}"/>
+              </a:ext>
+            </a:extLst>
+          </p:cNvPr>
+          <p:cNvGrpSpPr/>
+          <p:nvPr/>
+        </p:nvGrpSpPr>
+        <p:grpSpPr>
+          <a:xfrm>
+            <a:off x="1557466" y="1576917"/>
+            <a:ext cx="8983533" cy="3704166"/>
+            <a:chOff x="1557466" y="1576917"/>
+            <a:chExt cx="8983533" cy="3704166"/>
+          </a:xfrm>
+        </p:grpSpPr>
+        <p:pic>
+          <p:nvPicPr>
+            <p:cNvPr id="5" name="Picture 4">
+              <a:extLst>
+                <a:ext uri="{FF2B5EF4-FFF2-40B4-BE49-F238E27FC236}">
+                  <a16:creationId xmlns:a16="http://schemas.microsoft.com/office/drawing/2014/main" id="{A095807B-7741-D64C-A5E5-391639F83B75}"/>
+                </a:ext>
+              </a:extLst>
+            </p:cNvPr>
+            <p:cNvPicPr>
+              <a:picLocks noChangeAspect="1"/>
+            </p:cNvPicPr>
+            <p:nvPr/>
+          </p:nvPicPr>
+          <p:blipFill>
+            <a:blip r:embed="rId2"/>
+            <a:srcRect/>
+            <a:stretch/>
+          </p:blipFill>
+          <p:spPr>
+            <a:xfrm>
+              <a:off x="6096000" y="1576917"/>
+              <a:ext cx="4444999" cy="3704166"/>
+            </a:xfrm>
+            <a:prstGeom prst="rect">
+              <a:avLst/>
+            </a:prstGeom>
+          </p:spPr>
+        </p:pic>
+        <p:pic>
+          <p:nvPicPr>
+            <p:cNvPr id="7" name="Picture 6">
+              <a:extLst>
+                <a:ext uri="{FF2B5EF4-FFF2-40B4-BE49-F238E27FC236}">
+                  <a16:creationId xmlns:a16="http://schemas.microsoft.com/office/drawing/2014/main" id="{B2220DDB-1D9B-AA46-BE15-061C8A74AD67}"/>
+                </a:ext>
+              </a:extLst>
+            </p:cNvPr>
+            <p:cNvPicPr>
+              <a:picLocks noChangeAspect="1"/>
+            </p:cNvPicPr>
+            <p:nvPr/>
+          </p:nvPicPr>
+          <p:blipFill>
+            <a:blip r:embed="rId3"/>
+            <a:srcRect/>
+            <a:stretch/>
+          </p:blipFill>
+          <p:spPr>
+            <a:xfrm>
+              <a:off x="1557466" y="1576917"/>
+              <a:ext cx="4444999" cy="3704166"/>
+            </a:xfrm>
+            <a:prstGeom prst="rect">
+              <a:avLst/>
+            </a:prstGeom>
+          </p:spPr>
+        </p:pic>
+        <p:sp>
+          <p:nvSpPr>
+            <p:cNvPr id="8" name="TextBox 7">
+              <a:extLst>
+                <a:ext uri="{FF2B5EF4-FFF2-40B4-BE49-F238E27FC236}">
+                  <a16:creationId xmlns:a16="http://schemas.microsoft.com/office/drawing/2014/main" id="{A2198951-9881-E543-AD5A-B544C0B75082}"/>
+                </a:ext>
+              </a:extLst>
+            </p:cNvPr>
+            <p:cNvSpPr txBox="1"/>
+            <p:nvPr/>
+          </p:nvSpPr>
+          <p:spPr>
+            <a:xfrm>
+              <a:off x="2139793" y="1576917"/>
+              <a:ext cx="365806" cy="369332"/>
+            </a:xfrm>
+            <a:prstGeom prst="rect">
+              <a:avLst/>
+            </a:prstGeom>
+            <a:noFill/>
+          </p:spPr>
+          <p:txBody>
+            <a:bodyPr wrap="none" rtlCol="0">
+              <a:spAutoFit/>
+            </a:bodyPr>
+            <a:lstStyle/>
+            <a:p>
+              <a:r>
+                <a:rPr lang="en-US" dirty="0"/>
+                <a:t>a)</a:t>
+              </a:r>
+            </a:p>
+          </p:txBody>
+        </p:sp>
+        <p:sp>
+          <p:nvSpPr>
+            <p:cNvPr id="9" name="TextBox 8">
+              <a:extLst>
+                <a:ext uri="{FF2B5EF4-FFF2-40B4-BE49-F238E27FC236}">
+                  <a16:creationId xmlns:a16="http://schemas.microsoft.com/office/drawing/2014/main" id="{63A1D4F4-BF69-A34D-A373-C842D00BC3D3}"/>
+                </a:ext>
+              </a:extLst>
+            </p:cNvPr>
+            <p:cNvSpPr txBox="1"/>
+            <p:nvPr/>
+          </p:nvSpPr>
+          <p:spPr>
+            <a:xfrm>
+              <a:off x="6655028" y="1576917"/>
+              <a:ext cx="377026" cy="369332"/>
+            </a:xfrm>
+            <a:prstGeom prst="rect">
+              <a:avLst/>
+            </a:prstGeom>
+            <a:noFill/>
+          </p:spPr>
+          <p:txBody>
+            <a:bodyPr wrap="none" rtlCol="0">
+              <a:spAutoFit/>
+            </a:bodyPr>
+            <a:lstStyle/>
+            <a:p>
+              <a:r>
+                <a:rPr lang="en-US" dirty="0"/>
+                <a:t>b)</a:t>
+              </a:r>
+            </a:p>
+          </p:txBody>
+        </p:sp>
+      </p:grpSp>
+      <p:sp>
+        <p:nvSpPr>
+          <p:cNvPr id="2" name="Rectangle 1">
+            <a:extLst>
+              <a:ext uri="{FF2B5EF4-FFF2-40B4-BE49-F238E27FC236}">
+                <a16:creationId xmlns:a16="http://schemas.microsoft.com/office/drawing/2014/main" id="{78CB23F4-2A11-914C-9A3E-8A61C9ED7BF1}"/>
+              </a:ext>
+            </a:extLst>
+          </p:cNvPr>
+          <p:cNvSpPr/>
+          <p:nvPr/>
+        </p:nvSpPr>
+        <p:spPr>
+          <a:xfrm>
+            <a:off x="2663687" y="5029200"/>
+            <a:ext cx="2802835" cy="251883"/>
+          </a:xfrm>
+          <a:prstGeom prst="rect">
+            <a:avLst/>
+          </a:prstGeom>
+          <a:solidFill>
+            <a:schemeClr val="bg1"/>
+          </a:solidFill>
+          <a:ln>
+            <a:solidFill>
+              <a:schemeClr val="bg1"/>
+            </a:solidFill>
+          </a:ln>
+        </p:spPr>
+        <p:style>
+          <a:lnRef idx="2">
+            <a:schemeClr val="accent1">
+              <a:shade val="50000"/>
+            </a:schemeClr>
+          </a:lnRef>
+          <a:fillRef idx="1">
+            <a:schemeClr val="accent1"/>
+          </a:fillRef>
+          <a:effectRef idx="0">
+            <a:schemeClr val="accent1"/>
+          </a:effectRef>
+          <a:fontRef idx="minor">
+            <a:schemeClr val="lt1"/>
+          </a:fontRef>
+        </p:style>
+        <p:txBody>
+          <a:bodyPr rtlCol="0" anchor="ctr"/>
+          <a:lstStyle/>
+          <a:p>
+            <a:pPr algn="ctr"/>
+            <a:endParaRPr lang="en-US"/>
+          </a:p>
+        </p:txBody>
+      </p:sp>
+      <p:sp>
+        <p:nvSpPr>
+          <p:cNvPr id="11" name="Rectangle 10">
+            <a:extLst>
+              <a:ext uri="{FF2B5EF4-FFF2-40B4-BE49-F238E27FC236}">
+                <a16:creationId xmlns:a16="http://schemas.microsoft.com/office/drawing/2014/main" id="{09B9D8CE-287D-8D4E-9CEA-E64FAEC0C692}"/>
+              </a:ext>
+            </a:extLst>
+          </p:cNvPr>
+          <p:cNvSpPr/>
+          <p:nvPr/>
+        </p:nvSpPr>
+        <p:spPr>
+          <a:xfrm>
+            <a:off x="7022646" y="5029199"/>
+            <a:ext cx="2802835" cy="251883"/>
+          </a:xfrm>
+          <a:prstGeom prst="rect">
+            <a:avLst/>
+          </a:prstGeom>
+          <a:solidFill>
+            <a:schemeClr val="bg1"/>
+          </a:solidFill>
+          <a:ln>
+            <a:solidFill>
+              <a:schemeClr val="bg1"/>
+            </a:solidFill>
+          </a:ln>
+        </p:spPr>
+        <p:style>
+          <a:lnRef idx="2">
+            <a:schemeClr val="accent1">
+              <a:shade val="50000"/>
+            </a:schemeClr>
+          </a:lnRef>
+          <a:fillRef idx="1">
+            <a:schemeClr val="accent1"/>
+          </a:fillRef>
+          <a:effectRef idx="0">
+            <a:schemeClr val="accent1"/>
+          </a:effectRef>
+          <a:fontRef idx="minor">
+            <a:schemeClr val="lt1"/>
+          </a:fontRef>
+        </p:style>
+        <p:txBody>
+          <a:bodyPr rtlCol="0" anchor="ctr"/>
+          <a:lstStyle/>
+          <a:p>
+            <a:pPr algn="ctr"/>
+            <a:endParaRPr lang="en-US"/>
+          </a:p>
+        </p:txBody>
+      </p:sp>
+      <p:sp>
+        <p:nvSpPr>
+          <p:cNvPr id="3" name="TextBox 2">
+            <a:extLst>
+              <a:ext uri="{FF2B5EF4-FFF2-40B4-BE49-F238E27FC236}">
+                <a16:creationId xmlns:a16="http://schemas.microsoft.com/office/drawing/2014/main" id="{FB202CBE-268C-0F40-AF18-A010ABD764DD}"/>
+              </a:ext>
+            </a:extLst>
+          </p:cNvPr>
+          <p:cNvSpPr txBox="1"/>
+          <p:nvPr/>
+        </p:nvSpPr>
+        <p:spPr>
+          <a:xfrm>
+            <a:off x="5294067" y="5046989"/>
+            <a:ext cx="1834220" cy="369332"/>
+          </a:xfrm>
+          <a:prstGeom prst="rect">
+            <a:avLst/>
+          </a:prstGeom>
+          <a:noFill/>
+        </p:spPr>
+        <p:txBody>
+          <a:bodyPr wrap="none" rtlCol="0">
+            <a:spAutoFit/>
+          </a:bodyPr>
+          <a:lstStyle/>
+          <a:p>
+            <a:r>
+              <a:rPr lang="en-US" dirty="0"/>
+              <a:t>Temperature (°C )</a:t>
+            </a:r>
+          </a:p>
+        </p:txBody>
+      </p:sp>
+    </p:spTree>
+    <p:extLst>
+      <p:ext uri="{BB962C8B-B14F-4D97-AF65-F5344CB8AC3E}">
+        <p14:creationId xmlns:p14="http://schemas.microsoft.com/office/powerpoint/2010/main" val="875502019"/>
+      </p:ext>
+    </p:extLst>
+  </p:cSld>
+  <p:clrMapOvr>
+    <a:masterClrMapping/>
+  </p:clrMapOvr>
+</p:sld>
+</file>
+
+<file path=ppt/slides/slide7.xml><?xml version="1.0" encoding="utf-8"?>
+<p:sld xmlns:a="http://schemas.openxmlformats.org/drawingml/2006/main" xmlns:r="http://schemas.openxmlformats.org/officeDocument/2006/relationships" xmlns:p="http://schemas.openxmlformats.org/presentationml/2006/main">
+  <p:cSld>
+    <p:spTree>
+      <p:nvGrpSpPr>
+        <p:cNvPr id="1" name=""/>
+        <p:cNvGrpSpPr/>
+        <p:nvPr/>
+      </p:nvGrpSpPr>
+      <p:grpSpPr>
+        <a:xfrm>
+          <a:off x="0" y="0"/>
+          <a:ext cx="0" cy="0"/>
+          <a:chOff x="0" y="0"/>
+          <a:chExt cx="0" cy="0"/>
+        </a:xfrm>
+      </p:grpSpPr>
+      <p:pic>
+        <p:nvPicPr>
+          <p:cNvPr id="13" name="Picture 12" descr="Chart&#10;&#10;Description automatically generated">
+            <a:extLst>
+              <a:ext uri="{FF2B5EF4-FFF2-40B4-BE49-F238E27FC236}">
+                <a16:creationId xmlns:a16="http://schemas.microsoft.com/office/drawing/2014/main" id="{1FFA3F7C-1428-F245-A84D-634C4C290B1A}"/>
+              </a:ext>
+            </a:extLst>
+          </p:cNvPr>
+          <p:cNvPicPr>
+            <a:picLocks noChangeAspect="1"/>
+          </p:cNvPicPr>
+          <p:nvPr/>
+        </p:nvPicPr>
+        <p:blipFill>
+          <a:blip r:embed="rId2"/>
+          <a:stretch>
+            <a:fillRect/>
+          </a:stretch>
+        </p:blipFill>
+        <p:spPr>
+          <a:xfrm>
+            <a:off x="5343219" y="1676143"/>
+            <a:ext cx="4325928" cy="3604940"/>
+          </a:xfrm>
+          <a:prstGeom prst="rect">
+            <a:avLst/>
+          </a:prstGeom>
+        </p:spPr>
+      </p:pic>
+      <p:pic>
+        <p:nvPicPr>
+          <p:cNvPr id="6" name="Picture 5" descr="Chart&#10;&#10;Description automatically generated">
+            <a:extLst>
+              <a:ext uri="{FF2B5EF4-FFF2-40B4-BE49-F238E27FC236}">
+                <a16:creationId xmlns:a16="http://schemas.microsoft.com/office/drawing/2014/main" id="{FBD50CCB-266B-4942-9EA5-8A35290FF7CC}"/>
+              </a:ext>
+            </a:extLst>
+          </p:cNvPr>
+          <p:cNvPicPr>
+            <a:picLocks noChangeAspect="1"/>
+          </p:cNvPicPr>
+          <p:nvPr/>
+        </p:nvPicPr>
+        <p:blipFill>
+          <a:blip r:embed="rId3"/>
+          <a:stretch>
+            <a:fillRect/>
+          </a:stretch>
+        </p:blipFill>
+        <p:spPr>
+          <a:xfrm>
+            <a:off x="1770072" y="1676143"/>
+            <a:ext cx="4325928" cy="3604940"/>
+          </a:xfrm>
+          <a:prstGeom prst="rect">
+            <a:avLst/>
+          </a:prstGeom>
+        </p:spPr>
+      </p:pic>
+      <p:grpSp>
+        <p:nvGrpSpPr>
+          <p:cNvPr id="10" name="Group 9">
+            <a:extLst>
+              <a:ext uri="{FF2B5EF4-FFF2-40B4-BE49-F238E27FC236}">
+                <a16:creationId xmlns:a16="http://schemas.microsoft.com/office/drawing/2014/main" id="{41191D86-EC28-E74F-BA1C-4E9F597D11F6}"/>
+              </a:ext>
+            </a:extLst>
+          </p:cNvPr>
+          <p:cNvGrpSpPr/>
+          <p:nvPr/>
+        </p:nvGrpSpPr>
+        <p:grpSpPr>
+          <a:xfrm>
+            <a:off x="2377021" y="1713531"/>
+            <a:ext cx="4091108" cy="369332"/>
+            <a:chOff x="2377021" y="1713531"/>
+            <a:chExt cx="4091108" cy="369332"/>
+          </a:xfrm>
+        </p:grpSpPr>
+        <p:sp>
+          <p:nvSpPr>
+            <p:cNvPr id="8" name="TextBox 7">
+              <a:extLst>
+                <a:ext uri="{FF2B5EF4-FFF2-40B4-BE49-F238E27FC236}">
+                  <a16:creationId xmlns:a16="http://schemas.microsoft.com/office/drawing/2014/main" id="{A2198951-9881-E543-AD5A-B544C0B75082}"/>
+                </a:ext>
+              </a:extLst>
+            </p:cNvPr>
+            <p:cNvSpPr txBox="1"/>
+            <p:nvPr/>
+          </p:nvSpPr>
+          <p:spPr>
+            <a:xfrm>
+              <a:off x="2377021" y="1713531"/>
+              <a:ext cx="365806" cy="369332"/>
+            </a:xfrm>
+            <a:prstGeom prst="rect">
+              <a:avLst/>
+            </a:prstGeom>
+            <a:noFill/>
+          </p:spPr>
+          <p:txBody>
+            <a:bodyPr wrap="none" rtlCol="0">
+              <a:spAutoFit/>
+            </a:bodyPr>
+            <a:lstStyle/>
+            <a:p>
+              <a:r>
+                <a:rPr lang="en-US" dirty="0"/>
+                <a:t>a)</a:t>
+              </a:r>
+            </a:p>
+          </p:txBody>
+        </p:sp>
+        <p:sp>
+          <p:nvSpPr>
+            <p:cNvPr id="9" name="TextBox 8">
+              <a:extLst>
+                <a:ext uri="{FF2B5EF4-FFF2-40B4-BE49-F238E27FC236}">
+                  <a16:creationId xmlns:a16="http://schemas.microsoft.com/office/drawing/2014/main" id="{63A1D4F4-BF69-A34D-A373-C842D00BC3D3}"/>
+                </a:ext>
+              </a:extLst>
+            </p:cNvPr>
+            <p:cNvSpPr txBox="1"/>
+            <p:nvPr/>
+          </p:nvSpPr>
+          <p:spPr>
+            <a:xfrm>
+              <a:off x="6091103" y="1713531"/>
+              <a:ext cx="377026" cy="369332"/>
+            </a:xfrm>
+            <a:prstGeom prst="rect">
+              <a:avLst/>
+            </a:prstGeom>
+            <a:noFill/>
+          </p:spPr>
+          <p:txBody>
+            <a:bodyPr wrap="none" rtlCol="0">
+              <a:spAutoFit/>
+            </a:bodyPr>
+            <a:lstStyle/>
+            <a:p>
+              <a:r>
+                <a:rPr lang="en-US" dirty="0"/>
+                <a:t>b)</a:t>
+              </a:r>
+            </a:p>
+          </p:txBody>
+        </p:sp>
+      </p:grpSp>
+    </p:spTree>
+    <p:extLst>
+      <p:ext uri="{BB962C8B-B14F-4D97-AF65-F5344CB8AC3E}">
+        <p14:creationId xmlns:p14="http://schemas.microsoft.com/office/powerpoint/2010/main" val="549457880"/>
+      </p:ext>
+    </p:extLst>
+  </p:cSld>
+  <p:clrMapOvr>
+    <a:masterClrMapping/>
+  </p:clrMapOvr>
+</p:sld>
+</file>
+
+<file path=ppt/slides/slide8.xml><?xml version="1.0" encoding="utf-8"?>
 <p:sld xmlns:a="http://schemas.openxmlformats.org/drawingml/2006/main" xmlns:r="http://schemas.openxmlformats.org/officeDocument/2006/relationships" xmlns:p="http://schemas.openxmlformats.org/presentationml/2006/main">
   <p:cSld>
     <p:spTree>
@@ -4608,6 +6163,173 @@
     <p:extLst>
       <p:ext uri="{BB962C8B-B14F-4D97-AF65-F5344CB8AC3E}">
         <p14:creationId xmlns:p14="http://schemas.microsoft.com/office/powerpoint/2010/main" val="1615842868"/>
+      </p:ext>
+    </p:extLst>
+  </p:cSld>
+  <p:clrMapOvr>
+    <a:masterClrMapping/>
+  </p:clrMapOvr>
+</p:sld>
+</file>
+
+<file path=ppt/slides/slide9.xml><?xml version="1.0" encoding="utf-8"?>
+<p:sld xmlns:a="http://schemas.openxmlformats.org/drawingml/2006/main" xmlns:r="http://schemas.openxmlformats.org/officeDocument/2006/relationships" xmlns:p="http://schemas.openxmlformats.org/presentationml/2006/main">
+  <p:cSld>
+    <p:spTree>
+      <p:nvGrpSpPr>
+        <p:cNvPr id="1" name=""/>
+        <p:cNvGrpSpPr/>
+        <p:nvPr/>
+      </p:nvGrpSpPr>
+      <p:grpSpPr>
+        <a:xfrm>
+          <a:off x="0" y="0"/>
+          <a:ext cx="0" cy="0"/>
+          <a:chOff x="0" y="0"/>
+          <a:chExt cx="0" cy="0"/>
+        </a:xfrm>
+      </p:grpSpPr>
+      <p:sp>
+        <p:nvSpPr>
+          <p:cNvPr id="2" name="Title 1">
+            <a:extLst>
+              <a:ext uri="{FF2B5EF4-FFF2-40B4-BE49-F238E27FC236}">
+                <a16:creationId xmlns:a16="http://schemas.microsoft.com/office/drawing/2014/main" id="{2158FDC7-10D5-E142-8149-947DED87180F}"/>
+              </a:ext>
+            </a:extLst>
+          </p:cNvPr>
+          <p:cNvSpPr>
+            <a:spLocks noGrp="1"/>
+          </p:cNvSpPr>
+          <p:nvPr>
+            <p:ph type="title"/>
+          </p:nvPr>
+        </p:nvSpPr>
+        <p:spPr/>
+        <p:txBody>
+          <a:bodyPr/>
+          <a:lstStyle/>
+          <a:p>
+            <a:endParaRPr lang="en-US"/>
+          </a:p>
+        </p:txBody>
+      </p:sp>
+      <p:sp>
+        <p:nvSpPr>
+          <p:cNvPr id="3" name="Content Placeholder 2">
+            <a:extLst>
+              <a:ext uri="{FF2B5EF4-FFF2-40B4-BE49-F238E27FC236}">
+                <a16:creationId xmlns:a16="http://schemas.microsoft.com/office/drawing/2014/main" id="{C1E47498-9D6F-DF4B-A768-5EAE9ED47966}"/>
+              </a:ext>
+            </a:extLst>
+          </p:cNvPr>
+          <p:cNvSpPr>
+            <a:spLocks noGrp="1"/>
+          </p:cNvSpPr>
+          <p:nvPr>
+            <p:ph idx="1"/>
+          </p:nvPr>
+        </p:nvSpPr>
+        <p:spPr/>
+        <p:txBody>
+          <a:bodyPr/>
+          <a:lstStyle/>
+          <a:p>
+            <a:endParaRPr lang="en-US" dirty="0"/>
+          </a:p>
+        </p:txBody>
+      </p:sp>
+      <p:pic>
+        <p:nvPicPr>
+          <p:cNvPr id="4" name="Picture 3">
+            <a:extLst>
+              <a:ext uri="{FF2B5EF4-FFF2-40B4-BE49-F238E27FC236}">
+                <a16:creationId xmlns:a16="http://schemas.microsoft.com/office/drawing/2014/main" id="{191E27FA-A770-4D4D-9C5D-B392D316FF30}"/>
+              </a:ext>
+            </a:extLst>
+          </p:cNvPr>
+          <p:cNvPicPr>
+            <a:picLocks noChangeAspect="1"/>
+          </p:cNvPicPr>
+          <p:nvPr/>
+        </p:nvPicPr>
+        <p:blipFill>
+          <a:blip r:embed="rId2"/>
+          <a:srcRect/>
+          <a:stretch/>
+        </p:blipFill>
+        <p:spPr>
+          <a:xfrm>
+            <a:off x="4415837" y="3454592"/>
+            <a:ext cx="3107431" cy="3107431"/>
+          </a:xfrm>
+          <a:prstGeom prst="rect">
+            <a:avLst/>
+          </a:prstGeom>
+        </p:spPr>
+      </p:pic>
+      <p:pic>
+        <p:nvPicPr>
+          <p:cNvPr id="5" name="Picture 4">
+            <a:extLst>
+              <a:ext uri="{FF2B5EF4-FFF2-40B4-BE49-F238E27FC236}">
+                <a16:creationId xmlns:a16="http://schemas.microsoft.com/office/drawing/2014/main" id="{BAB902EB-18C1-DC4D-BC59-12AA868E5046}"/>
+              </a:ext>
+            </a:extLst>
+          </p:cNvPr>
+          <p:cNvPicPr>
+            <a:picLocks noChangeAspect="1"/>
+          </p:cNvPicPr>
+          <p:nvPr/>
+        </p:nvPicPr>
+        <p:blipFill>
+          <a:blip r:embed="rId3"/>
+          <a:srcRect/>
+          <a:stretch/>
+        </p:blipFill>
+        <p:spPr>
+          <a:xfrm>
+            <a:off x="1561303" y="372752"/>
+            <a:ext cx="3107431" cy="3107431"/>
+          </a:xfrm>
+          <a:prstGeom prst="rect">
+            <a:avLst/>
+          </a:prstGeom>
+        </p:spPr>
+      </p:pic>
+      <p:pic>
+        <p:nvPicPr>
+          <p:cNvPr id="6" name="Picture 5">
+            <a:extLst>
+              <a:ext uri="{FF2B5EF4-FFF2-40B4-BE49-F238E27FC236}">
+                <a16:creationId xmlns:a16="http://schemas.microsoft.com/office/drawing/2014/main" id="{C8F9E206-C36E-0D46-BC02-D542F3C36D53}"/>
+              </a:ext>
+            </a:extLst>
+          </p:cNvPr>
+          <p:cNvPicPr>
+            <a:picLocks noChangeAspect="1"/>
+          </p:cNvPicPr>
+          <p:nvPr/>
+        </p:nvPicPr>
+        <p:blipFill>
+          <a:blip r:embed="rId4"/>
+          <a:srcRect/>
+          <a:stretch/>
+        </p:blipFill>
+        <p:spPr>
+          <a:xfrm>
+            <a:off x="1561303" y="3429000"/>
+            <a:ext cx="3107431" cy="3107431"/>
+          </a:xfrm>
+          <a:prstGeom prst="rect">
+            <a:avLst/>
+          </a:prstGeom>
+        </p:spPr>
+      </p:pic>
+    </p:spTree>
+    <p:extLst>
+      <p:ext uri="{BB962C8B-B14F-4D97-AF65-F5344CB8AC3E}">
+        <p14:creationId xmlns:p14="http://schemas.microsoft.com/office/powerpoint/2010/main" val="847945932"/>
       </p:ext>
     </p:extLst>
   </p:cSld>

</xml_diff>

<commit_message>
high res figures for report done
</commit_message>
<xml_diff>
--- a/figures/Final_curves/all_curves_figure/all_prob_curves_figure.pptx
+++ b/figures/Final_curves/all_curves_figure/all_prob_curves_figure.pptx
@@ -4201,6 +4201,35 @@
           <a:chExt cx="0" cy="0"/>
         </a:xfrm>
       </p:grpSpPr>
+      <p:pic>
+        <p:nvPicPr>
+          <p:cNvPr id="22" name="Picture 21">
+            <a:extLst>
+              <a:ext uri="{FF2B5EF4-FFF2-40B4-BE49-F238E27FC236}">
+                <a16:creationId xmlns:a16="http://schemas.microsoft.com/office/drawing/2014/main" id="{5CA301A2-1ADF-C547-92AF-886C86C3E0E3}"/>
+              </a:ext>
+            </a:extLst>
+          </p:cNvPr>
+          <p:cNvPicPr>
+            <a:picLocks noChangeAspect="1"/>
+          </p:cNvPicPr>
+          <p:nvPr/>
+        </p:nvPicPr>
+        <p:blipFill>
+          <a:blip r:embed="rId2"/>
+          <a:srcRect/>
+          <a:stretch/>
+        </p:blipFill>
+        <p:spPr>
+          <a:xfrm>
+            <a:off x="5915383" y="3548130"/>
+            <a:ext cx="3372061" cy="2697648"/>
+          </a:xfrm>
+          <a:prstGeom prst="rect">
+            <a:avLst/>
+          </a:prstGeom>
+        </p:spPr>
+      </p:pic>
       <p:grpSp>
         <p:nvGrpSpPr>
           <p:cNvPr id="18" name="Group 17">
@@ -4215,10 +4244,10 @@
         </p:nvGrpSpPr>
         <p:grpSpPr>
           <a:xfrm>
-            <a:off x="1639956" y="334364"/>
-            <a:ext cx="9148009" cy="6189271"/>
-            <a:chOff x="1126879" y="372752"/>
-            <a:chExt cx="9148009" cy="6189271"/>
+            <a:off x="1500228" y="334364"/>
+            <a:ext cx="9287737" cy="5101950"/>
+            <a:chOff x="987151" y="372752"/>
+            <a:chExt cx="9287737" cy="5101950"/>
           </a:xfrm>
         </p:grpSpPr>
         <p:grpSp>
@@ -4236,9 +4265,9 @@
           <p:grpSpPr>
             <a:xfrm>
               <a:off x="1561303" y="372752"/>
-              <a:ext cx="8713585" cy="6189271"/>
+              <a:ext cx="8713585" cy="3107431"/>
               <a:chOff x="-165421" y="-41467"/>
-              <a:chExt cx="8713585" cy="6189271"/>
+              <a:chExt cx="8713585" cy="3107431"/>
             </a:xfrm>
           </p:grpSpPr>
           <p:pic>
@@ -4256,7 +4285,7 @@
               <p:nvPr/>
             </p:nvPicPr>
             <p:blipFill>
-              <a:blip r:embed="rId2"/>
+              <a:blip r:embed="rId3"/>
               <a:srcRect/>
               <a:stretch/>
             </p:blipFill>
@@ -4285,42 +4314,13 @@
               <p:nvPr/>
             </p:nvPicPr>
             <p:blipFill>
-              <a:blip r:embed="rId3"/>
+              <a:blip r:embed="rId4"/>
               <a:srcRect/>
               <a:stretch/>
             </p:blipFill>
             <p:spPr>
               <a:xfrm>
                 <a:off x="2689113" y="-41467"/>
-                <a:ext cx="3107431" cy="3107431"/>
-              </a:xfrm>
-              <a:prstGeom prst="rect">
-                <a:avLst/>
-              </a:prstGeom>
-            </p:spPr>
-          </p:pic>
-          <p:pic>
-            <p:nvPicPr>
-              <p:cNvPr id="8" name="Picture 7">
-                <a:extLst>
-                  <a:ext uri="{FF2B5EF4-FFF2-40B4-BE49-F238E27FC236}">
-                    <a16:creationId xmlns:a16="http://schemas.microsoft.com/office/drawing/2014/main" id="{0D17157D-EB3F-0E47-9B58-C25A93899787}"/>
-                  </a:ext>
-                </a:extLst>
-              </p:cNvPr>
-              <p:cNvPicPr>
-                <a:picLocks noChangeAspect="1"/>
-              </p:cNvPicPr>
-              <p:nvPr/>
-            </p:nvPicPr>
-            <p:blipFill>
-              <a:blip r:embed="rId4"/>
-              <a:srcRect/>
-              <a:stretch/>
-            </p:blipFill>
-            <p:spPr>
-              <a:xfrm>
-                <a:off x="2689113" y="3040373"/>
                 <a:ext cx="3107431" cy="3107431"/>
               </a:xfrm>
               <a:prstGeom prst="rect">
@@ -4476,7 +4476,7 @@
           </p:nvSpPr>
           <p:spPr>
             <a:xfrm rot="16200000">
-              <a:off x="793134" y="3326294"/>
+              <a:off x="653406" y="3339091"/>
               <a:ext cx="975267" cy="307777"/>
             </a:xfrm>
             <a:prstGeom prst="rect">
@@ -4604,6 +4604,41 @@
         </p:sp>
         <p:sp>
           <p:nvSpPr>
+            <p:cNvPr id="17" name="TextBox 16">
+              <a:extLst>
+                <a:ext uri="{FF2B5EF4-FFF2-40B4-BE49-F238E27FC236}">
+                  <a16:creationId xmlns:a16="http://schemas.microsoft.com/office/drawing/2014/main" id="{470EDF46-DC31-934C-B8F4-9339E057D300}"/>
+                </a:ext>
+              </a:extLst>
+            </p:cNvPr>
+            <p:cNvSpPr txBox="1"/>
+            <p:nvPr/>
+          </p:nvSpPr>
+          <p:spPr>
+            <a:xfrm>
+              <a:off x="5048656" y="3498428"/>
+              <a:ext cx="370614" cy="369332"/>
+            </a:xfrm>
+            <a:prstGeom prst="rect">
+              <a:avLst/>
+            </a:prstGeom>
+            <a:noFill/>
+          </p:spPr>
+          <p:txBody>
+            <a:bodyPr wrap="none" rtlCol="0">
+              <a:spAutoFit/>
+            </a:bodyPr>
+            <a:lstStyle/>
+            <a:p>
+              <a:r>
+                <a:rPr lang="en-US" dirty="0"/>
+                <a:t>e)</a:t>
+              </a:r>
+            </a:p>
+          </p:txBody>
+        </p:sp>
+        <p:sp>
+          <p:nvSpPr>
             <p:cNvPr id="16" name="TextBox 15">
               <a:extLst>
                 <a:ext uri="{FF2B5EF4-FFF2-40B4-BE49-F238E27FC236}">
@@ -4616,7 +4651,7 @@
           </p:nvSpPr>
           <p:spPr>
             <a:xfrm>
-              <a:off x="1323942" y="3611281"/>
+              <a:off x="1196105" y="3498428"/>
               <a:ext cx="377026" cy="369332"/>
             </a:xfrm>
             <a:prstGeom prst="rect">
@@ -4637,41 +4672,6 @@
             </a:p>
           </p:txBody>
         </p:sp>
-        <p:sp>
-          <p:nvSpPr>
-            <p:cNvPr id="17" name="TextBox 16">
-              <a:extLst>
-                <a:ext uri="{FF2B5EF4-FFF2-40B4-BE49-F238E27FC236}">
-                  <a16:creationId xmlns:a16="http://schemas.microsoft.com/office/drawing/2014/main" id="{470EDF46-DC31-934C-B8F4-9339E057D300}"/>
-                </a:ext>
-              </a:extLst>
-            </p:cNvPr>
-            <p:cNvSpPr txBox="1"/>
-            <p:nvPr/>
-          </p:nvSpPr>
-          <p:spPr>
-            <a:xfrm>
-              <a:off x="4232934" y="3598485"/>
-              <a:ext cx="370614" cy="369332"/>
-            </a:xfrm>
-            <a:prstGeom prst="rect">
-              <a:avLst/>
-            </a:prstGeom>
-            <a:noFill/>
-          </p:spPr>
-          <p:txBody>
-            <a:bodyPr wrap="none" rtlCol="0">
-              <a:spAutoFit/>
-            </a:bodyPr>
-            <a:lstStyle/>
-            <a:p>
-              <a:r>
-                <a:rPr lang="en-US" dirty="0"/>
-                <a:t>e)</a:t>
-              </a:r>
-            </a:p>
-          </p:txBody>
-        </p:sp>
       </p:grpSp>
       <p:pic>
         <p:nvPicPr>
@@ -4695,7 +4695,7 @@
         </p:blipFill>
         <p:spPr>
           <a:xfrm>
-            <a:off x="1884418" y="3651411"/>
+            <a:off x="2074380" y="3502013"/>
             <a:ext cx="3487353" cy="2789882"/>
           </a:xfrm>
           <a:prstGeom prst="rect">

</xml_diff>

<commit_message>
models updated, bugs fixed and rerun
</commit_message>
<xml_diff>
--- a/figures/Final_curves/all_curves_figure/all_prob_curves_figure.pptx
+++ b/figures/Final_curves/all_curves_figure/all_prob_curves_figure.pptx
@@ -7,15 +7,17 @@
   <p:sldIdLst>
     <p:sldId id="256" r:id="rId2"/>
     <p:sldId id="266" r:id="rId3"/>
-    <p:sldId id="257" r:id="rId4"/>
-    <p:sldId id="258" r:id="rId5"/>
-    <p:sldId id="263" r:id="rId6"/>
-    <p:sldId id="264" r:id="rId7"/>
-    <p:sldId id="265" r:id="rId8"/>
-    <p:sldId id="259" r:id="rId9"/>
-    <p:sldId id="260" r:id="rId10"/>
-    <p:sldId id="261" r:id="rId11"/>
-    <p:sldId id="262" r:id="rId12"/>
+    <p:sldId id="267" r:id="rId4"/>
+    <p:sldId id="257" r:id="rId5"/>
+    <p:sldId id="258" r:id="rId6"/>
+    <p:sldId id="263" r:id="rId7"/>
+    <p:sldId id="264" r:id="rId8"/>
+    <p:sldId id="265" r:id="rId9"/>
+    <p:sldId id="259" r:id="rId10"/>
+    <p:sldId id="268" r:id="rId11"/>
+    <p:sldId id="260" r:id="rId12"/>
+    <p:sldId id="261" r:id="rId13"/>
+    <p:sldId id="262" r:id="rId14"/>
   </p:sldIdLst>
   <p:sldSz cx="12192000" cy="6858000"/>
   <p:notesSz cx="6858000" cy="9144000"/>
@@ -3867,6 +3869,457 @@
           <a:chExt cx="0" cy="0"/>
         </a:xfrm>
       </p:grpSpPr>
+      <p:grpSp>
+        <p:nvGrpSpPr>
+          <p:cNvPr id="24" name="Group 23">
+            <a:extLst>
+              <a:ext uri="{FF2B5EF4-FFF2-40B4-BE49-F238E27FC236}">
+                <a16:creationId xmlns:a16="http://schemas.microsoft.com/office/drawing/2014/main" id="{157FBF9E-9D40-E841-9FEF-9242ABEA93FB}"/>
+              </a:ext>
+            </a:extLst>
+          </p:cNvPr>
+          <p:cNvGrpSpPr/>
+          <p:nvPr/>
+        </p:nvGrpSpPr>
+        <p:grpSpPr>
+          <a:xfrm>
+            <a:off x="561202" y="108121"/>
+            <a:ext cx="8397447" cy="200798"/>
+            <a:chOff x="561202" y="108121"/>
+            <a:chExt cx="8397447" cy="200798"/>
+          </a:xfrm>
+        </p:grpSpPr>
+        <p:sp>
+          <p:nvSpPr>
+            <p:cNvPr id="22" name="Rectangle 21">
+              <a:extLst>
+                <a:ext uri="{FF2B5EF4-FFF2-40B4-BE49-F238E27FC236}">
+                  <a16:creationId xmlns:a16="http://schemas.microsoft.com/office/drawing/2014/main" id="{A2891527-AABE-B144-ABE6-8A4626553847}"/>
+                </a:ext>
+              </a:extLst>
+            </p:cNvPr>
+            <p:cNvSpPr/>
+            <p:nvPr/>
+          </p:nvSpPr>
+          <p:spPr>
+            <a:xfrm>
+              <a:off x="6096000" y="108121"/>
+              <a:ext cx="2862649" cy="200798"/>
+            </a:xfrm>
+            <a:prstGeom prst="rect">
+              <a:avLst/>
+            </a:prstGeom>
+            <a:solidFill>
+              <a:schemeClr val="bg1"/>
+            </a:solidFill>
+            <a:ln>
+              <a:noFill/>
+            </a:ln>
+          </p:spPr>
+          <p:style>
+            <a:lnRef idx="2">
+              <a:schemeClr val="accent1">
+                <a:shade val="50000"/>
+              </a:schemeClr>
+            </a:lnRef>
+            <a:fillRef idx="1">
+              <a:schemeClr val="accent1"/>
+            </a:fillRef>
+            <a:effectRef idx="0">
+              <a:schemeClr val="accent1"/>
+            </a:effectRef>
+            <a:fontRef idx="minor">
+              <a:schemeClr val="lt1"/>
+            </a:fontRef>
+          </p:style>
+          <p:txBody>
+            <a:bodyPr rtlCol="0" anchor="ctr"/>
+            <a:lstStyle/>
+            <a:p>
+              <a:pPr algn="ctr"/>
+              <a:endParaRPr lang="en-US"/>
+            </a:p>
+          </p:txBody>
+        </p:sp>
+        <p:sp>
+          <p:nvSpPr>
+            <p:cNvPr id="23" name="Rectangle 22">
+              <a:extLst>
+                <a:ext uri="{FF2B5EF4-FFF2-40B4-BE49-F238E27FC236}">
+                  <a16:creationId xmlns:a16="http://schemas.microsoft.com/office/drawing/2014/main" id="{4FA2C797-4D91-AD4F-A1E6-ACED8F187899}"/>
+                </a:ext>
+              </a:extLst>
+            </p:cNvPr>
+            <p:cNvSpPr/>
+            <p:nvPr/>
+          </p:nvSpPr>
+          <p:spPr>
+            <a:xfrm>
+              <a:off x="561202" y="108121"/>
+              <a:ext cx="2862649" cy="200798"/>
+            </a:xfrm>
+            <a:prstGeom prst="rect">
+              <a:avLst/>
+            </a:prstGeom>
+            <a:solidFill>
+              <a:schemeClr val="bg1"/>
+            </a:solidFill>
+            <a:ln>
+              <a:noFill/>
+            </a:ln>
+          </p:spPr>
+          <p:style>
+            <a:lnRef idx="2">
+              <a:schemeClr val="accent1">
+                <a:shade val="50000"/>
+              </a:schemeClr>
+            </a:lnRef>
+            <a:fillRef idx="1">
+              <a:schemeClr val="accent1"/>
+            </a:fillRef>
+            <a:effectRef idx="0">
+              <a:schemeClr val="accent1"/>
+            </a:effectRef>
+            <a:fontRef idx="minor">
+              <a:schemeClr val="lt1"/>
+            </a:fontRef>
+          </p:style>
+          <p:txBody>
+            <a:bodyPr rtlCol="0" anchor="ctr"/>
+            <a:lstStyle/>
+            <a:p>
+              <a:pPr algn="ctr"/>
+              <a:endParaRPr lang="en-US"/>
+            </a:p>
+          </p:txBody>
+        </p:sp>
+      </p:grpSp>
+      <p:pic>
+        <p:nvPicPr>
+          <p:cNvPr id="3" name="Picture 2">
+            <a:extLst>
+              <a:ext uri="{FF2B5EF4-FFF2-40B4-BE49-F238E27FC236}">
+                <a16:creationId xmlns:a16="http://schemas.microsoft.com/office/drawing/2014/main" id="{BA974717-569D-DA45-B5E0-A3C017BBF3C4}"/>
+              </a:ext>
+            </a:extLst>
+          </p:cNvPr>
+          <p:cNvPicPr>
+            <a:picLocks noChangeAspect="1"/>
+          </p:cNvPicPr>
+          <p:nvPr/>
+        </p:nvPicPr>
+        <p:blipFill>
+          <a:blip r:embed="rId2"/>
+          <a:srcRect/>
+          <a:stretch/>
+        </p:blipFill>
+        <p:spPr>
+          <a:xfrm>
+            <a:off x="74655" y="577852"/>
+            <a:ext cx="5572384" cy="4643653"/>
+          </a:xfrm>
+          <a:prstGeom prst="rect">
+            <a:avLst/>
+          </a:prstGeom>
+        </p:spPr>
+      </p:pic>
+      <p:pic>
+        <p:nvPicPr>
+          <p:cNvPr id="5" name="Picture 4">
+            <a:extLst>
+              <a:ext uri="{FF2B5EF4-FFF2-40B4-BE49-F238E27FC236}">
+                <a16:creationId xmlns:a16="http://schemas.microsoft.com/office/drawing/2014/main" id="{19356096-9AC3-D141-9A47-D9CBE47CDB0F}"/>
+              </a:ext>
+            </a:extLst>
+          </p:cNvPr>
+          <p:cNvPicPr>
+            <a:picLocks noChangeAspect="1"/>
+          </p:cNvPicPr>
+          <p:nvPr/>
+        </p:nvPicPr>
+        <p:blipFill>
+          <a:blip r:embed="rId3"/>
+          <a:stretch>
+            <a:fillRect/>
+          </a:stretch>
+        </p:blipFill>
+        <p:spPr>
+          <a:xfrm>
+            <a:off x="5689258" y="577852"/>
+            <a:ext cx="5572383" cy="4643653"/>
+          </a:xfrm>
+          <a:prstGeom prst="rect">
+            <a:avLst/>
+          </a:prstGeom>
+        </p:spPr>
+      </p:pic>
+      <p:sp>
+        <p:nvSpPr>
+          <p:cNvPr id="25" name="TextBox 24">
+            <a:extLst>
+              <a:ext uri="{FF2B5EF4-FFF2-40B4-BE49-F238E27FC236}">
+                <a16:creationId xmlns:a16="http://schemas.microsoft.com/office/drawing/2014/main" id="{6718DB7D-38EE-BB44-AD97-509EF3C4F9DD}"/>
+              </a:ext>
+            </a:extLst>
+          </p:cNvPr>
+          <p:cNvSpPr txBox="1"/>
+          <p:nvPr/>
+        </p:nvSpPr>
+        <p:spPr>
+          <a:xfrm>
+            <a:off x="49941" y="577852"/>
+            <a:ext cx="569440" cy="369332"/>
+          </a:xfrm>
+          <a:prstGeom prst="rect">
+            <a:avLst/>
+          </a:prstGeom>
+          <a:noFill/>
+        </p:spPr>
+        <p:txBody>
+          <a:bodyPr wrap="square" rtlCol="0">
+            <a:spAutoFit/>
+          </a:bodyPr>
+          <a:lstStyle/>
+          <a:p>
+            <a:r>
+              <a:rPr lang="en-US" dirty="0"/>
+              <a:t>a)</a:t>
+            </a:r>
+          </a:p>
+        </p:txBody>
+      </p:sp>
+      <p:sp>
+        <p:nvSpPr>
+          <p:cNvPr id="26" name="TextBox 25">
+            <a:extLst>
+              <a:ext uri="{FF2B5EF4-FFF2-40B4-BE49-F238E27FC236}">
+                <a16:creationId xmlns:a16="http://schemas.microsoft.com/office/drawing/2014/main" id="{0AB040A8-2F7C-7E4E-8B0F-CAD8F60A7F24}"/>
+              </a:ext>
+            </a:extLst>
+          </p:cNvPr>
+          <p:cNvSpPr txBox="1"/>
+          <p:nvPr/>
+        </p:nvSpPr>
+        <p:spPr>
+          <a:xfrm>
+            <a:off x="5671753" y="577852"/>
+            <a:ext cx="569440" cy="369332"/>
+          </a:xfrm>
+          <a:prstGeom prst="rect">
+            <a:avLst/>
+          </a:prstGeom>
+          <a:noFill/>
+        </p:spPr>
+        <p:txBody>
+          <a:bodyPr wrap="square" rtlCol="0">
+            <a:spAutoFit/>
+          </a:bodyPr>
+          <a:lstStyle/>
+          <a:p>
+            <a:r>
+              <a:rPr lang="en-US" dirty="0"/>
+              <a:t>b)</a:t>
+            </a:r>
+          </a:p>
+        </p:txBody>
+      </p:sp>
+    </p:spTree>
+    <p:extLst>
+      <p:ext uri="{BB962C8B-B14F-4D97-AF65-F5344CB8AC3E}">
+        <p14:creationId xmlns:p14="http://schemas.microsoft.com/office/powerpoint/2010/main" val="2092861234"/>
+      </p:ext>
+    </p:extLst>
+  </p:cSld>
+  <p:clrMapOvr>
+    <a:masterClrMapping/>
+  </p:clrMapOvr>
+</p:sld>
+</file>
+
+<file path=ppt/slides/slide11.xml><?xml version="1.0" encoding="utf-8"?>
+<p:sld xmlns:a="http://schemas.openxmlformats.org/drawingml/2006/main" xmlns:r="http://schemas.openxmlformats.org/officeDocument/2006/relationships" xmlns:p="http://schemas.openxmlformats.org/presentationml/2006/main">
+  <p:cSld>
+    <p:spTree>
+      <p:nvGrpSpPr>
+        <p:cNvPr id="1" name=""/>
+        <p:cNvGrpSpPr/>
+        <p:nvPr/>
+      </p:nvGrpSpPr>
+      <p:grpSpPr>
+        <a:xfrm>
+          <a:off x="0" y="0"/>
+          <a:ext cx="0" cy="0"/>
+          <a:chOff x="0" y="0"/>
+          <a:chExt cx="0" cy="0"/>
+        </a:xfrm>
+      </p:grpSpPr>
+      <p:sp>
+        <p:nvSpPr>
+          <p:cNvPr id="2" name="Title 1">
+            <a:extLst>
+              <a:ext uri="{FF2B5EF4-FFF2-40B4-BE49-F238E27FC236}">
+                <a16:creationId xmlns:a16="http://schemas.microsoft.com/office/drawing/2014/main" id="{2158FDC7-10D5-E142-8149-947DED87180F}"/>
+              </a:ext>
+            </a:extLst>
+          </p:cNvPr>
+          <p:cNvSpPr>
+            <a:spLocks noGrp="1"/>
+          </p:cNvSpPr>
+          <p:nvPr>
+            <p:ph type="title"/>
+          </p:nvPr>
+        </p:nvSpPr>
+        <p:spPr/>
+        <p:txBody>
+          <a:bodyPr/>
+          <a:lstStyle/>
+          <a:p>
+            <a:endParaRPr lang="en-US"/>
+          </a:p>
+        </p:txBody>
+      </p:sp>
+      <p:sp>
+        <p:nvSpPr>
+          <p:cNvPr id="3" name="Content Placeholder 2">
+            <a:extLst>
+              <a:ext uri="{FF2B5EF4-FFF2-40B4-BE49-F238E27FC236}">
+                <a16:creationId xmlns:a16="http://schemas.microsoft.com/office/drawing/2014/main" id="{C1E47498-9D6F-DF4B-A768-5EAE9ED47966}"/>
+              </a:ext>
+            </a:extLst>
+          </p:cNvPr>
+          <p:cNvSpPr>
+            <a:spLocks noGrp="1"/>
+          </p:cNvSpPr>
+          <p:nvPr>
+            <p:ph idx="1"/>
+          </p:nvPr>
+        </p:nvSpPr>
+        <p:spPr/>
+        <p:txBody>
+          <a:bodyPr/>
+          <a:lstStyle/>
+          <a:p>
+            <a:endParaRPr lang="en-US" dirty="0"/>
+          </a:p>
+        </p:txBody>
+      </p:sp>
+      <p:pic>
+        <p:nvPicPr>
+          <p:cNvPr id="4" name="Picture 3">
+            <a:extLst>
+              <a:ext uri="{FF2B5EF4-FFF2-40B4-BE49-F238E27FC236}">
+                <a16:creationId xmlns:a16="http://schemas.microsoft.com/office/drawing/2014/main" id="{191E27FA-A770-4D4D-9C5D-B392D316FF30}"/>
+              </a:ext>
+            </a:extLst>
+          </p:cNvPr>
+          <p:cNvPicPr>
+            <a:picLocks noChangeAspect="1"/>
+          </p:cNvPicPr>
+          <p:nvPr/>
+        </p:nvPicPr>
+        <p:blipFill>
+          <a:blip r:embed="rId2"/>
+          <a:srcRect/>
+          <a:stretch/>
+        </p:blipFill>
+        <p:spPr>
+          <a:xfrm>
+            <a:off x="4415837" y="3454592"/>
+            <a:ext cx="3107431" cy="3107431"/>
+          </a:xfrm>
+          <a:prstGeom prst="rect">
+            <a:avLst/>
+          </a:prstGeom>
+        </p:spPr>
+      </p:pic>
+      <p:pic>
+        <p:nvPicPr>
+          <p:cNvPr id="5" name="Picture 4">
+            <a:extLst>
+              <a:ext uri="{FF2B5EF4-FFF2-40B4-BE49-F238E27FC236}">
+                <a16:creationId xmlns:a16="http://schemas.microsoft.com/office/drawing/2014/main" id="{BAB902EB-18C1-DC4D-BC59-12AA868E5046}"/>
+              </a:ext>
+            </a:extLst>
+          </p:cNvPr>
+          <p:cNvPicPr>
+            <a:picLocks noChangeAspect="1"/>
+          </p:cNvPicPr>
+          <p:nvPr/>
+        </p:nvPicPr>
+        <p:blipFill>
+          <a:blip r:embed="rId3"/>
+          <a:srcRect/>
+          <a:stretch/>
+        </p:blipFill>
+        <p:spPr>
+          <a:xfrm>
+            <a:off x="1561303" y="372752"/>
+            <a:ext cx="3107431" cy="3107431"/>
+          </a:xfrm>
+          <a:prstGeom prst="rect">
+            <a:avLst/>
+          </a:prstGeom>
+        </p:spPr>
+      </p:pic>
+      <p:pic>
+        <p:nvPicPr>
+          <p:cNvPr id="6" name="Picture 5">
+            <a:extLst>
+              <a:ext uri="{FF2B5EF4-FFF2-40B4-BE49-F238E27FC236}">
+                <a16:creationId xmlns:a16="http://schemas.microsoft.com/office/drawing/2014/main" id="{C8F9E206-C36E-0D46-BC02-D542F3C36D53}"/>
+              </a:ext>
+            </a:extLst>
+          </p:cNvPr>
+          <p:cNvPicPr>
+            <a:picLocks noChangeAspect="1"/>
+          </p:cNvPicPr>
+          <p:nvPr/>
+        </p:nvPicPr>
+        <p:blipFill>
+          <a:blip r:embed="rId4"/>
+          <a:srcRect/>
+          <a:stretch/>
+        </p:blipFill>
+        <p:spPr>
+          <a:xfrm>
+            <a:off x="1561303" y="3429000"/>
+            <a:ext cx="3107431" cy="3107431"/>
+          </a:xfrm>
+          <a:prstGeom prst="rect">
+            <a:avLst/>
+          </a:prstGeom>
+        </p:spPr>
+      </p:pic>
+    </p:spTree>
+    <p:extLst>
+      <p:ext uri="{BB962C8B-B14F-4D97-AF65-F5344CB8AC3E}">
+        <p14:creationId xmlns:p14="http://schemas.microsoft.com/office/powerpoint/2010/main" val="847945932"/>
+      </p:ext>
+    </p:extLst>
+  </p:cSld>
+  <p:clrMapOvr>
+    <a:masterClrMapping/>
+  </p:clrMapOvr>
+</p:sld>
+</file>
+
+<file path=ppt/slides/slide12.xml><?xml version="1.0" encoding="utf-8"?>
+<p:sld xmlns:a="http://schemas.openxmlformats.org/drawingml/2006/main" xmlns:r="http://schemas.openxmlformats.org/officeDocument/2006/relationships" xmlns:p="http://schemas.openxmlformats.org/presentationml/2006/main">
+  <p:cSld>
+    <p:spTree>
+      <p:nvGrpSpPr>
+        <p:cNvPr id="1" name=""/>
+        <p:cNvGrpSpPr/>
+        <p:nvPr/>
+      </p:nvGrpSpPr>
+      <p:grpSpPr>
+        <a:xfrm>
+          <a:off x="0" y="0"/>
+          <a:ext cx="0" cy="0"/>
+          <a:chOff x="0" y="0"/>
+          <a:chExt cx="0" cy="0"/>
+        </a:xfrm>
+      </p:grpSpPr>
       <p:sp>
         <p:nvSpPr>
           <p:cNvPr id="2" name="Title 1">
@@ -4017,7 +4470,7 @@
 </p:sld>
 </file>
 
-<file path=ppt/slides/slide11.xml><?xml version="1.0" encoding="utf-8"?>
+<file path=ppt/slides/slide13.xml><?xml version="1.0" encoding="utf-8"?>
 <p:sld xmlns:a="http://schemas.openxmlformats.org/drawingml/2006/main" xmlns:r="http://schemas.openxmlformats.org/officeDocument/2006/relationships" xmlns:p="http://schemas.openxmlformats.org/presentationml/2006/main">
   <p:cSld>
     <p:spTree>
@@ -4244,10 +4697,10 @@
         </p:nvGrpSpPr>
         <p:grpSpPr>
           <a:xfrm>
-            <a:off x="1500228" y="334364"/>
-            <a:ext cx="9287737" cy="5101950"/>
-            <a:chOff x="987151" y="372752"/>
-            <a:chExt cx="9287737" cy="5101950"/>
+            <a:off x="499011" y="310084"/>
+            <a:ext cx="11040089" cy="5089160"/>
+            <a:chOff x="34031" y="385542"/>
+            <a:chExt cx="11040089" cy="5089160"/>
           </a:xfrm>
         </p:grpSpPr>
         <p:grpSp>
@@ -4264,10 +4717,10 @@
           </p:nvGrpSpPr>
           <p:grpSpPr>
             <a:xfrm>
-              <a:off x="1561303" y="372752"/>
-              <a:ext cx="8713585" cy="3107431"/>
-              <a:chOff x="-165421" y="-41467"/>
-              <a:chExt cx="8713585" cy="3107431"/>
+              <a:off x="803568" y="385542"/>
+              <a:ext cx="10270552" cy="3107431"/>
+              <a:chOff x="-923156" y="-28677"/>
+              <a:chExt cx="10270552" cy="3107431"/>
             </a:xfrm>
           </p:grpSpPr>
           <p:pic>
@@ -4291,7 +4744,7 @@
             </p:blipFill>
             <p:spPr>
               <a:xfrm>
-                <a:off x="5547123" y="39332"/>
+                <a:off x="6346355" y="11727"/>
                 <a:ext cx="3001041" cy="3001041"/>
               </a:xfrm>
               <a:prstGeom prst="rect">
@@ -4320,7 +4773,7 @@
             </p:blipFill>
             <p:spPr>
               <a:xfrm>
-                <a:off x="2689113" y="-41467"/>
+                <a:off x="3147838" y="-28677"/>
                 <a:ext cx="3107431" cy="3107431"/>
               </a:xfrm>
               <a:prstGeom prst="rect">
@@ -4349,8 +4802,8 @@
             </p:blipFill>
             <p:spPr>
               <a:xfrm>
-                <a:off x="-165421" y="-41467"/>
-                <a:ext cx="3107431" cy="3107431"/>
+                <a:off x="-923156" y="269276"/>
+                <a:ext cx="3429366" cy="2743492"/>
               </a:xfrm>
               <a:prstGeom prst="rect">
                 <a:avLst/>
@@ -4358,58 +4811,6 @@
             </p:spPr>
           </p:pic>
         </p:grpSp>
-        <p:sp>
-          <p:nvSpPr>
-            <p:cNvPr id="10" name="Rectangle 9">
-              <a:extLst>
-                <a:ext uri="{FF2B5EF4-FFF2-40B4-BE49-F238E27FC236}">
-                  <a16:creationId xmlns:a16="http://schemas.microsoft.com/office/drawing/2014/main" id="{AE4C4DB9-C597-C847-A93B-CBD9BCF3261F}"/>
-                </a:ext>
-              </a:extLst>
-            </p:cNvPr>
-            <p:cNvSpPr/>
-            <p:nvPr/>
-          </p:nvSpPr>
-          <p:spPr>
-            <a:xfrm>
-              <a:off x="1441174" y="1351722"/>
-              <a:ext cx="198783" cy="983974"/>
-            </a:xfrm>
-            <a:prstGeom prst="rect">
-              <a:avLst/>
-            </a:prstGeom>
-            <a:solidFill>
-              <a:schemeClr val="bg1"/>
-            </a:solidFill>
-            <a:ln>
-              <a:noFill/>
-            </a:ln>
-          </p:spPr>
-          <p:style>
-            <a:lnRef idx="2">
-              <a:schemeClr val="accent1">
-                <a:shade val="50000"/>
-              </a:schemeClr>
-            </a:lnRef>
-            <a:fillRef idx="1">
-              <a:schemeClr val="accent1"/>
-            </a:fillRef>
-            <a:effectRef idx="0">
-              <a:schemeClr val="accent1"/>
-            </a:effectRef>
-            <a:fontRef idx="minor">
-              <a:schemeClr val="lt1"/>
-            </a:fontRef>
-          </p:style>
-          <p:txBody>
-            <a:bodyPr rtlCol="0" anchor="ctr"/>
-            <a:lstStyle/>
-            <a:p>
-              <a:pPr algn="ctr"/>
-              <a:endParaRPr lang="en-US"/>
-            </a:p>
-          </p:txBody>
-        </p:sp>
         <p:sp>
           <p:nvSpPr>
             <p:cNvPr id="11" name="Rectangle 10">
@@ -4476,7 +4877,7 @@
           </p:nvSpPr>
           <p:spPr>
             <a:xfrm rot="16200000">
-              <a:off x="653406" y="3339091"/>
+              <a:off x="-299714" y="3350569"/>
               <a:ext cx="975267" cy="307777"/>
             </a:xfrm>
             <a:prstGeom prst="rect">
@@ -4511,7 +4912,7 @@
           </p:nvSpPr>
           <p:spPr>
             <a:xfrm>
-              <a:off x="1195497" y="492905"/>
+              <a:off x="403206" y="511165"/>
               <a:ext cx="365806" cy="369332"/>
             </a:xfrm>
             <a:prstGeom prst="rect">
@@ -4546,7 +4947,7 @@
           </p:nvSpPr>
           <p:spPr>
             <a:xfrm>
-              <a:off x="4232934" y="492905"/>
+              <a:off x="3712938" y="522708"/>
               <a:ext cx="377026" cy="369332"/>
             </a:xfrm>
             <a:prstGeom prst="rect">
@@ -4604,6 +5005,41 @@
         </p:sp>
         <p:sp>
           <p:nvSpPr>
+            <p:cNvPr id="16" name="TextBox 15">
+              <a:extLst>
+                <a:ext uri="{FF2B5EF4-FFF2-40B4-BE49-F238E27FC236}">
+                  <a16:creationId xmlns:a16="http://schemas.microsoft.com/office/drawing/2014/main" id="{0B187B8A-6A24-9F4A-AB35-F79D4D712451}"/>
+                </a:ext>
+              </a:extLst>
+            </p:cNvPr>
+            <p:cNvSpPr txBox="1"/>
+            <p:nvPr/>
+          </p:nvSpPr>
+          <p:spPr>
+            <a:xfrm>
+              <a:off x="397596" y="3498428"/>
+              <a:ext cx="377026" cy="369332"/>
+            </a:xfrm>
+            <a:prstGeom prst="rect">
+              <a:avLst/>
+            </a:prstGeom>
+            <a:noFill/>
+          </p:spPr>
+          <p:txBody>
+            <a:bodyPr wrap="none" rtlCol="0">
+              <a:spAutoFit/>
+            </a:bodyPr>
+            <a:lstStyle/>
+            <a:p>
+              <a:r>
+                <a:rPr lang="en-US" dirty="0"/>
+                <a:t>d)</a:t>
+              </a:r>
+            </a:p>
+          </p:txBody>
+        </p:sp>
+        <p:sp>
+          <p:nvSpPr>
             <p:cNvPr id="17" name="TextBox 16">
               <a:extLst>
                 <a:ext uri="{FF2B5EF4-FFF2-40B4-BE49-F238E27FC236}">
@@ -4616,7 +5052,7 @@
           </p:nvSpPr>
           <p:spPr>
             <a:xfrm>
-              <a:off x="5048656" y="3498428"/>
+              <a:off x="4227199" y="3522030"/>
               <a:ext cx="370614" cy="369332"/>
             </a:xfrm>
             <a:prstGeom prst="rect">
@@ -4637,41 +5073,6 @@
             </a:p>
           </p:txBody>
         </p:sp>
-        <p:sp>
-          <p:nvSpPr>
-            <p:cNvPr id="16" name="TextBox 15">
-              <a:extLst>
-                <a:ext uri="{FF2B5EF4-FFF2-40B4-BE49-F238E27FC236}">
-                  <a16:creationId xmlns:a16="http://schemas.microsoft.com/office/drawing/2014/main" id="{0B187B8A-6A24-9F4A-AB35-F79D4D712451}"/>
-                </a:ext>
-              </a:extLst>
-            </p:cNvPr>
-            <p:cNvSpPr txBox="1"/>
-            <p:nvPr/>
-          </p:nvSpPr>
-          <p:spPr>
-            <a:xfrm>
-              <a:off x="1196105" y="3498428"/>
-              <a:ext cx="377026" cy="369332"/>
-            </a:xfrm>
-            <a:prstGeom prst="rect">
-              <a:avLst/>
-            </a:prstGeom>
-            <a:noFill/>
-          </p:spPr>
-          <p:txBody>
-            <a:bodyPr wrap="none" rtlCol="0">
-              <a:spAutoFit/>
-            </a:bodyPr>
-            <a:lstStyle/>
-            <a:p>
-              <a:r>
-                <a:rPr lang="en-US" dirty="0"/>
-                <a:t>d)</a:t>
-              </a:r>
-            </a:p>
-          </p:txBody>
-        </p:sp>
       </p:grpSp>
       <p:pic>
         <p:nvPicPr>
@@ -4695,7 +5096,7 @@
         </p:blipFill>
         <p:spPr>
           <a:xfrm>
-            <a:off x="2074380" y="3502013"/>
+            <a:off x="1239554" y="3512316"/>
             <a:ext cx="3487353" cy="2789882"/>
           </a:xfrm>
           <a:prstGeom prst="rect">
@@ -4735,10 +5136,10 @@
       </p:grpSpPr>
       <p:grpSp>
         <p:nvGrpSpPr>
-          <p:cNvPr id="12" name="Group 11">
-            <a:extLst>
-              <a:ext uri="{FF2B5EF4-FFF2-40B4-BE49-F238E27FC236}">
-                <a16:creationId xmlns:a16="http://schemas.microsoft.com/office/drawing/2014/main" id="{97BAD663-0FB5-F241-85A2-67E482AADAED}"/>
+          <p:cNvPr id="18" name="Group 17">
+            <a:extLst>
+              <a:ext uri="{FF2B5EF4-FFF2-40B4-BE49-F238E27FC236}">
+                <a16:creationId xmlns:a16="http://schemas.microsoft.com/office/drawing/2014/main" id="{CFC49E58-2911-694F-BA0C-0BEF3250D166}"/>
               </a:ext>
             </a:extLst>
           </p:cNvPr>
@@ -4747,10 +5148,437 @@
         </p:nvGrpSpPr>
         <p:grpSpPr>
           <a:xfrm>
-            <a:off x="795128" y="280325"/>
-            <a:ext cx="9379636" cy="6343391"/>
-            <a:chOff x="795128" y="280325"/>
-            <a:chExt cx="9379636" cy="6343391"/>
+            <a:off x="416986" y="417253"/>
+            <a:ext cx="11503337" cy="5884945"/>
+            <a:chOff x="416986" y="417253"/>
+            <a:chExt cx="11503337" cy="5884945"/>
+          </a:xfrm>
+        </p:grpSpPr>
+        <p:grpSp>
+          <p:nvGrpSpPr>
+            <p:cNvPr id="16" name="Group 15">
+              <a:extLst>
+                <a:ext uri="{FF2B5EF4-FFF2-40B4-BE49-F238E27FC236}">
+                  <a16:creationId xmlns:a16="http://schemas.microsoft.com/office/drawing/2014/main" id="{A09D48E5-F282-964D-8CF1-5F8B0BEE71CB}"/>
+                </a:ext>
+              </a:extLst>
+            </p:cNvPr>
+            <p:cNvGrpSpPr/>
+            <p:nvPr/>
+          </p:nvGrpSpPr>
+          <p:grpSpPr>
+            <a:xfrm>
+              <a:off x="774774" y="417253"/>
+              <a:ext cx="11145549" cy="5884945"/>
+              <a:chOff x="774774" y="417253"/>
+              <a:chExt cx="11145549" cy="5884945"/>
+            </a:xfrm>
+          </p:grpSpPr>
+          <p:pic>
+            <p:nvPicPr>
+              <p:cNvPr id="4" name="Picture 3">
+                <a:extLst>
+                  <a:ext uri="{FF2B5EF4-FFF2-40B4-BE49-F238E27FC236}">
+                    <a16:creationId xmlns:a16="http://schemas.microsoft.com/office/drawing/2014/main" id="{304A0361-7D3F-CE4A-8125-05A361CE5A46}"/>
+                  </a:ext>
+                </a:extLst>
+              </p:cNvPr>
+              <p:cNvPicPr>
+                <a:picLocks noChangeAspect="1"/>
+              </p:cNvPicPr>
+              <p:nvPr/>
+            </p:nvPicPr>
+            <p:blipFill>
+              <a:blip r:embed="rId2"/>
+              <a:srcRect/>
+              <a:stretch/>
+            </p:blipFill>
+            <p:spPr>
+              <a:xfrm>
+                <a:off x="1239554" y="3512316"/>
+                <a:ext cx="3487352" cy="2789882"/>
+              </a:xfrm>
+              <a:prstGeom prst="rect">
+                <a:avLst/>
+              </a:prstGeom>
+            </p:spPr>
+          </p:pic>
+          <p:pic>
+            <p:nvPicPr>
+              <p:cNvPr id="5" name="Picture 4">
+                <a:extLst>
+                  <a:ext uri="{FF2B5EF4-FFF2-40B4-BE49-F238E27FC236}">
+                    <a16:creationId xmlns:a16="http://schemas.microsoft.com/office/drawing/2014/main" id="{A4E74CCA-45EF-A24D-9434-32423AE83285}"/>
+                  </a:ext>
+                </a:extLst>
+              </p:cNvPr>
+              <p:cNvPicPr>
+                <a:picLocks noChangeAspect="1"/>
+              </p:cNvPicPr>
+              <p:nvPr/>
+            </p:nvPicPr>
+            <p:blipFill>
+              <a:blip r:embed="rId3"/>
+              <a:srcRect/>
+              <a:stretch/>
+            </p:blipFill>
+            <p:spPr>
+              <a:xfrm>
+                <a:off x="4815632" y="3558433"/>
+                <a:ext cx="3372060" cy="2697648"/>
+              </a:xfrm>
+              <a:prstGeom prst="rect">
+                <a:avLst/>
+              </a:prstGeom>
+            </p:spPr>
+          </p:pic>
+          <p:pic>
+            <p:nvPicPr>
+              <p:cNvPr id="6" name="Picture 5">
+                <a:extLst>
+                  <a:ext uri="{FF2B5EF4-FFF2-40B4-BE49-F238E27FC236}">
+                    <a16:creationId xmlns:a16="http://schemas.microsoft.com/office/drawing/2014/main" id="{2D2718E9-5EB9-CA49-8823-428BBF485627}"/>
+                  </a:ext>
+                </a:extLst>
+              </p:cNvPr>
+              <p:cNvPicPr>
+                <a:picLocks noChangeAspect="1"/>
+              </p:cNvPicPr>
+              <p:nvPr/>
+            </p:nvPicPr>
+            <p:blipFill>
+              <a:blip r:embed="rId4"/>
+              <a:srcRect/>
+              <a:stretch/>
+            </p:blipFill>
+            <p:spPr>
+              <a:xfrm>
+                <a:off x="1239554" y="555802"/>
+                <a:ext cx="3429365" cy="2743492"/>
+              </a:xfrm>
+              <a:prstGeom prst="rect">
+                <a:avLst/>
+              </a:prstGeom>
+            </p:spPr>
+          </p:pic>
+          <p:pic>
+            <p:nvPicPr>
+              <p:cNvPr id="8" name="Picture 7">
+                <a:extLst>
+                  <a:ext uri="{FF2B5EF4-FFF2-40B4-BE49-F238E27FC236}">
+                    <a16:creationId xmlns:a16="http://schemas.microsoft.com/office/drawing/2014/main" id="{14B0EFC9-15EE-DD4A-A090-888D56C3E2F9}"/>
+                  </a:ext>
+                </a:extLst>
+              </p:cNvPr>
+              <p:cNvPicPr>
+                <a:picLocks noChangeAspect="1"/>
+              </p:cNvPicPr>
+              <p:nvPr/>
+            </p:nvPicPr>
+            <p:blipFill>
+              <a:blip r:embed="rId5"/>
+              <a:srcRect/>
+              <a:stretch/>
+            </p:blipFill>
+            <p:spPr>
+              <a:xfrm>
+                <a:off x="4757985" y="509412"/>
+                <a:ext cx="3487352" cy="2789882"/>
+              </a:xfrm>
+              <a:prstGeom prst="rect">
+                <a:avLst/>
+              </a:prstGeom>
+            </p:spPr>
+          </p:pic>
+          <p:pic>
+            <p:nvPicPr>
+              <p:cNvPr id="10" name="Picture 9">
+                <a:extLst>
+                  <a:ext uri="{FF2B5EF4-FFF2-40B4-BE49-F238E27FC236}">
+                    <a16:creationId xmlns:a16="http://schemas.microsoft.com/office/drawing/2014/main" id="{769EBF46-C650-D645-9E57-7E3297C9482C}"/>
+                  </a:ext>
+                </a:extLst>
+              </p:cNvPr>
+              <p:cNvPicPr>
+                <a:picLocks noChangeAspect="1"/>
+              </p:cNvPicPr>
+              <p:nvPr/>
+            </p:nvPicPr>
+            <p:blipFill>
+              <a:blip r:embed="rId6"/>
+              <a:srcRect/>
+              <a:stretch/>
+            </p:blipFill>
+            <p:spPr>
+              <a:xfrm>
+                <a:off x="8432971" y="509412"/>
+                <a:ext cx="3487352" cy="2789882"/>
+              </a:xfrm>
+              <a:prstGeom prst="rect">
+                <a:avLst/>
+              </a:prstGeom>
+            </p:spPr>
+          </p:pic>
+          <p:sp>
+            <p:nvSpPr>
+              <p:cNvPr id="11" name="TextBox 10">
+                <a:extLst>
+                  <a:ext uri="{FF2B5EF4-FFF2-40B4-BE49-F238E27FC236}">
+                    <a16:creationId xmlns:a16="http://schemas.microsoft.com/office/drawing/2014/main" id="{03378A23-112E-6645-A433-5DD5042E48F8}"/>
+                  </a:ext>
+                </a:extLst>
+              </p:cNvPr>
+              <p:cNvSpPr txBox="1"/>
+              <p:nvPr/>
+            </p:nvSpPr>
+            <p:spPr>
+              <a:xfrm>
+                <a:off x="784683" y="417253"/>
+                <a:ext cx="365806" cy="369332"/>
+              </a:xfrm>
+              <a:prstGeom prst="rect">
+                <a:avLst/>
+              </a:prstGeom>
+              <a:noFill/>
+            </p:spPr>
+            <p:txBody>
+              <a:bodyPr wrap="none" rtlCol="0">
+                <a:spAutoFit/>
+              </a:bodyPr>
+              <a:lstStyle/>
+              <a:p>
+                <a:r>
+                  <a:rPr lang="en-US" dirty="0"/>
+                  <a:t>a)</a:t>
+                </a:r>
+              </a:p>
+            </p:txBody>
+          </p:sp>
+          <p:sp>
+            <p:nvSpPr>
+              <p:cNvPr id="12" name="TextBox 11">
+                <a:extLst>
+                  <a:ext uri="{FF2B5EF4-FFF2-40B4-BE49-F238E27FC236}">
+                    <a16:creationId xmlns:a16="http://schemas.microsoft.com/office/drawing/2014/main" id="{CBDB3BE6-C2DC-8A4F-BE5F-318C8B9CAAD5}"/>
+                  </a:ext>
+                </a:extLst>
+              </p:cNvPr>
+              <p:cNvSpPr txBox="1"/>
+              <p:nvPr/>
+            </p:nvSpPr>
+            <p:spPr>
+              <a:xfrm>
+                <a:off x="4380959" y="435707"/>
+                <a:ext cx="377026" cy="369332"/>
+              </a:xfrm>
+              <a:prstGeom prst="rect">
+                <a:avLst/>
+              </a:prstGeom>
+              <a:noFill/>
+            </p:spPr>
+            <p:txBody>
+              <a:bodyPr wrap="none" rtlCol="0">
+                <a:spAutoFit/>
+              </a:bodyPr>
+              <a:lstStyle/>
+              <a:p>
+                <a:r>
+                  <a:rPr lang="en-US" dirty="0"/>
+                  <a:t>b)</a:t>
+                </a:r>
+              </a:p>
+            </p:txBody>
+          </p:sp>
+          <p:sp>
+            <p:nvSpPr>
+              <p:cNvPr id="13" name="TextBox 12">
+                <a:extLst>
+                  <a:ext uri="{FF2B5EF4-FFF2-40B4-BE49-F238E27FC236}">
+                    <a16:creationId xmlns:a16="http://schemas.microsoft.com/office/drawing/2014/main" id="{CC925A29-30D7-044D-9FD7-F0E354D2E74E}"/>
+                  </a:ext>
+                </a:extLst>
+              </p:cNvPr>
+              <p:cNvSpPr txBox="1"/>
+              <p:nvPr/>
+            </p:nvSpPr>
+            <p:spPr>
+              <a:xfrm>
+                <a:off x="8079989" y="417253"/>
+                <a:ext cx="352982" cy="369332"/>
+              </a:xfrm>
+              <a:prstGeom prst="rect">
+                <a:avLst/>
+              </a:prstGeom>
+              <a:noFill/>
+            </p:spPr>
+            <p:txBody>
+              <a:bodyPr wrap="none" rtlCol="0">
+                <a:spAutoFit/>
+              </a:bodyPr>
+              <a:lstStyle/>
+              <a:p>
+                <a:r>
+                  <a:rPr lang="en-US" dirty="0"/>
+                  <a:t>c)</a:t>
+                </a:r>
+              </a:p>
+            </p:txBody>
+          </p:sp>
+          <p:sp>
+            <p:nvSpPr>
+              <p:cNvPr id="14" name="TextBox 13">
+                <a:extLst>
+                  <a:ext uri="{FF2B5EF4-FFF2-40B4-BE49-F238E27FC236}">
+                    <a16:creationId xmlns:a16="http://schemas.microsoft.com/office/drawing/2014/main" id="{A3F58D85-1475-824F-B5C8-CD1DD477173D}"/>
+                  </a:ext>
+                </a:extLst>
+              </p:cNvPr>
+              <p:cNvSpPr txBox="1"/>
+              <p:nvPr/>
+            </p:nvSpPr>
+            <p:spPr>
+              <a:xfrm>
+                <a:off x="774774" y="3446572"/>
+                <a:ext cx="377026" cy="369332"/>
+              </a:xfrm>
+              <a:prstGeom prst="rect">
+                <a:avLst/>
+              </a:prstGeom>
+              <a:noFill/>
+            </p:spPr>
+            <p:txBody>
+              <a:bodyPr wrap="none" rtlCol="0">
+                <a:spAutoFit/>
+              </a:bodyPr>
+              <a:lstStyle/>
+              <a:p>
+                <a:r>
+                  <a:rPr lang="en-US" dirty="0"/>
+                  <a:t>d)</a:t>
+                </a:r>
+              </a:p>
+            </p:txBody>
+          </p:sp>
+          <p:sp>
+            <p:nvSpPr>
+              <p:cNvPr id="15" name="TextBox 14">
+                <a:extLst>
+                  <a:ext uri="{FF2B5EF4-FFF2-40B4-BE49-F238E27FC236}">
+                    <a16:creationId xmlns:a16="http://schemas.microsoft.com/office/drawing/2014/main" id="{D022D170-42C8-8941-A307-5580DAD474F1}"/>
+                  </a:ext>
+                </a:extLst>
+              </p:cNvPr>
+              <p:cNvSpPr txBox="1"/>
+              <p:nvPr/>
+            </p:nvSpPr>
+            <p:spPr>
+              <a:xfrm>
+                <a:off x="4444047" y="3391453"/>
+                <a:ext cx="370614" cy="369332"/>
+              </a:xfrm>
+              <a:prstGeom prst="rect">
+                <a:avLst/>
+              </a:prstGeom>
+              <a:noFill/>
+            </p:spPr>
+            <p:txBody>
+              <a:bodyPr wrap="none" rtlCol="0">
+                <a:spAutoFit/>
+              </a:bodyPr>
+              <a:lstStyle/>
+              <a:p>
+                <a:r>
+                  <a:rPr lang="en-US" dirty="0"/>
+                  <a:t>e)</a:t>
+                </a:r>
+              </a:p>
+            </p:txBody>
+          </p:sp>
+        </p:grpSp>
+        <p:sp>
+          <p:nvSpPr>
+            <p:cNvPr id="17" name="TextBox 16">
+              <a:extLst>
+                <a:ext uri="{FF2B5EF4-FFF2-40B4-BE49-F238E27FC236}">
+                  <a16:creationId xmlns:a16="http://schemas.microsoft.com/office/drawing/2014/main" id="{01CA7555-7845-4047-818F-444335B7F736}"/>
+                </a:ext>
+              </a:extLst>
+            </p:cNvPr>
+            <p:cNvSpPr txBox="1"/>
+            <p:nvPr/>
+          </p:nvSpPr>
+          <p:spPr>
+            <a:xfrm rot="16200000">
+              <a:off x="-741505" y="3302075"/>
+              <a:ext cx="2655535" cy="338554"/>
+            </a:xfrm>
+            <a:prstGeom prst="rect">
+              <a:avLst/>
+            </a:prstGeom>
+            <a:noFill/>
+          </p:spPr>
+          <p:txBody>
+            <a:bodyPr wrap="none" rtlCol="0">
+              <a:spAutoFit/>
+            </a:bodyPr>
+            <a:lstStyle/>
+            <a:p>
+              <a:r>
+                <a:rPr lang="en-US" sz="1600" dirty="0"/>
+                <a:t>Probability distribution Range</a:t>
+              </a:r>
+            </a:p>
+          </p:txBody>
+        </p:sp>
+      </p:grpSp>
+    </p:spTree>
+    <p:extLst>
+      <p:ext uri="{BB962C8B-B14F-4D97-AF65-F5344CB8AC3E}">
+        <p14:creationId xmlns:p14="http://schemas.microsoft.com/office/powerpoint/2010/main" val="3703610209"/>
+      </p:ext>
+    </p:extLst>
+  </p:cSld>
+  <p:clrMapOvr>
+    <a:masterClrMapping/>
+  </p:clrMapOvr>
+</p:sld>
+</file>
+
+<file path=ppt/slides/slide4.xml><?xml version="1.0" encoding="utf-8"?>
+<p:sld xmlns:a="http://schemas.openxmlformats.org/drawingml/2006/main" xmlns:r="http://schemas.openxmlformats.org/officeDocument/2006/relationships" xmlns:p="http://schemas.openxmlformats.org/presentationml/2006/main">
+  <p:cSld>
+    <p:spTree>
+      <p:nvGrpSpPr>
+        <p:cNvPr id="1" name=""/>
+        <p:cNvGrpSpPr/>
+        <p:nvPr/>
+      </p:nvGrpSpPr>
+      <p:grpSpPr>
+        <a:xfrm>
+          <a:off x="0" y="0"/>
+          <a:ext cx="0" cy="0"/>
+          <a:chOff x="0" y="0"/>
+          <a:chExt cx="0" cy="0"/>
+        </a:xfrm>
+      </p:grpSpPr>
+      <p:grpSp>
+        <p:nvGrpSpPr>
+          <p:cNvPr id="12" name="Group 11">
+            <a:extLst>
+              <a:ext uri="{FF2B5EF4-FFF2-40B4-BE49-F238E27FC236}">
+                <a16:creationId xmlns:a16="http://schemas.microsoft.com/office/drawing/2014/main" id="{97BAD663-0FB5-F241-85A2-67E482AADAED}"/>
+              </a:ext>
+            </a:extLst>
+          </p:cNvPr>
+          <p:cNvGrpSpPr/>
+          <p:nvPr/>
+        </p:nvGrpSpPr>
+        <p:grpSpPr>
+          <a:xfrm>
+            <a:off x="795130" y="234284"/>
+            <a:ext cx="8115246" cy="6389432"/>
+            <a:chOff x="795130" y="234284"/>
+            <a:chExt cx="8115246" cy="6389432"/>
           </a:xfrm>
         </p:grpSpPr>
         <p:pic>
@@ -4774,8 +5602,8 @@
           </p:blipFill>
           <p:spPr>
             <a:xfrm>
-              <a:off x="795129" y="3429000"/>
-              <a:ext cx="4472602" cy="3194716"/>
+              <a:off x="1160059" y="3429000"/>
+              <a:ext cx="3833659" cy="3194716"/>
             </a:xfrm>
             <a:prstGeom prst="rect">
               <a:avLst/>
@@ -4784,7 +5612,7 @@
         </p:pic>
         <p:pic>
           <p:nvPicPr>
-            <p:cNvPr id="5" name="Picture 4" descr="A close up of a map&#10;&#10;Description automatically generated">
+            <p:cNvPr id="5" name="Picture 4">
               <a:extLst>
                 <a:ext uri="{FF2B5EF4-FFF2-40B4-BE49-F238E27FC236}">
                   <a16:creationId xmlns:a16="http://schemas.microsoft.com/office/drawing/2014/main" id="{43CB6138-13BA-FC45-8120-E27ED0D04B1C}"/>
@@ -4798,14 +5626,13 @@
           </p:nvPicPr>
           <p:blipFill>
             <a:blip r:embed="rId3"/>
-            <a:stretch>
-              <a:fillRect/>
-            </a:stretch>
+            <a:srcRect/>
+            <a:stretch/>
           </p:blipFill>
           <p:spPr>
             <a:xfrm>
-              <a:off x="5702162" y="3429000"/>
-              <a:ext cx="4472602" cy="3194716"/>
+              <a:off x="5076717" y="3429000"/>
+              <a:ext cx="3833659" cy="3194716"/>
             </a:xfrm>
             <a:prstGeom prst="rect">
               <a:avLst/>
@@ -4814,7 +5641,7 @@
         </p:pic>
         <p:pic>
           <p:nvPicPr>
-            <p:cNvPr id="6" name="Picture 5" descr="A close up of a map&#10;&#10;Description automatically generated">
+            <p:cNvPr id="6" name="Picture 5">
               <a:extLst>
                 <a:ext uri="{FF2B5EF4-FFF2-40B4-BE49-F238E27FC236}">
                   <a16:creationId xmlns:a16="http://schemas.microsoft.com/office/drawing/2014/main" id="{F0D3E538-CECB-2943-96ED-28A5F365D9CD}"/>
@@ -4828,14 +5655,13 @@
           </p:nvPicPr>
           <p:blipFill>
             <a:blip r:embed="rId4"/>
-            <a:stretch>
-              <a:fillRect/>
-            </a:stretch>
+            <a:srcRect/>
+            <a:stretch/>
           </p:blipFill>
           <p:spPr>
             <a:xfrm>
-              <a:off x="795128" y="280325"/>
-              <a:ext cx="4472603" cy="3194716"/>
+              <a:off x="1122090" y="234284"/>
+              <a:ext cx="3833659" cy="3194716"/>
             </a:xfrm>
             <a:prstGeom prst="rect">
               <a:avLst/>
@@ -4844,7 +5670,7 @@
         </p:pic>
         <p:pic>
           <p:nvPicPr>
-            <p:cNvPr id="7" name="Picture 6" descr="A picture containing map&#10;&#10;Description automatically generated">
+            <p:cNvPr id="7" name="Picture 6">
               <a:extLst>
                 <a:ext uri="{FF2B5EF4-FFF2-40B4-BE49-F238E27FC236}">
                   <a16:creationId xmlns:a16="http://schemas.microsoft.com/office/drawing/2014/main" id="{51B2B03C-43A8-A144-B49F-35371B4EDCF9}"/>
@@ -4858,14 +5684,13 @@
           </p:nvPicPr>
           <p:blipFill>
             <a:blip r:embed="rId5"/>
-            <a:stretch>
-              <a:fillRect/>
-            </a:stretch>
+            <a:srcRect/>
+            <a:stretch/>
           </p:blipFill>
           <p:spPr>
             <a:xfrm>
-              <a:off x="5702161" y="280325"/>
-              <a:ext cx="4472603" cy="3194716"/>
+              <a:off x="5076717" y="234284"/>
+              <a:ext cx="3833659" cy="3194716"/>
             </a:xfrm>
             <a:prstGeom prst="rect">
               <a:avLst/>
@@ -4886,7 +5711,7 @@
           </p:nvSpPr>
           <p:spPr>
             <a:xfrm>
-              <a:off x="795130" y="596348"/>
+              <a:off x="863249" y="411682"/>
               <a:ext cx="365806" cy="369332"/>
             </a:xfrm>
             <a:prstGeom prst="rect">
@@ -4921,7 +5746,7 @@
           </p:nvSpPr>
           <p:spPr>
             <a:xfrm>
-              <a:off x="5513649" y="596348"/>
+              <a:off x="4699691" y="411682"/>
               <a:ext cx="377026" cy="369332"/>
             </a:xfrm>
             <a:prstGeom prst="rect">
@@ -4956,7 +5781,7 @@
           </p:nvSpPr>
           <p:spPr>
             <a:xfrm>
-              <a:off x="795130" y="3718490"/>
+              <a:off x="795130" y="3606398"/>
               <a:ext cx="352982" cy="369332"/>
             </a:xfrm>
             <a:prstGeom prst="rect">
@@ -4991,7 +5816,7 @@
           </p:nvSpPr>
           <p:spPr>
             <a:xfrm>
-              <a:off x="5513649" y="3718490"/>
+              <a:off x="4699691" y="3606398"/>
               <a:ext cx="377026" cy="369332"/>
             </a:xfrm>
             <a:prstGeom prst="rect">
@@ -5013,6 +5838,176 @@
           </p:txBody>
         </p:sp>
       </p:grpSp>
+      <p:sp>
+        <p:nvSpPr>
+          <p:cNvPr id="2" name="Rectangle 1">
+            <a:extLst>
+              <a:ext uri="{FF2B5EF4-FFF2-40B4-BE49-F238E27FC236}">
+                <a16:creationId xmlns:a16="http://schemas.microsoft.com/office/drawing/2014/main" id="{00192D43-A08E-464E-B20E-DDE51837845F}"/>
+              </a:ext>
+            </a:extLst>
+          </p:cNvPr>
+          <p:cNvSpPr/>
+          <p:nvPr/>
+        </p:nvSpPr>
+        <p:spPr>
+          <a:xfrm>
+            <a:off x="1077060" y="3579837"/>
+            <a:ext cx="526553" cy="2796249"/>
+          </a:xfrm>
+          <a:prstGeom prst="rect">
+            <a:avLst/>
+          </a:prstGeom>
+          <a:solidFill>
+            <a:schemeClr val="bg1"/>
+          </a:solidFill>
+          <a:ln>
+            <a:solidFill>
+              <a:schemeClr val="bg1"/>
+            </a:solidFill>
+          </a:ln>
+        </p:spPr>
+        <p:style>
+          <a:lnRef idx="2">
+            <a:schemeClr val="accent1">
+              <a:shade val="50000"/>
+            </a:schemeClr>
+          </a:lnRef>
+          <a:fillRef idx="1">
+            <a:schemeClr val="accent1"/>
+          </a:fillRef>
+          <a:effectRef idx="0">
+            <a:schemeClr val="accent1"/>
+          </a:effectRef>
+          <a:fontRef idx="minor">
+            <a:schemeClr val="lt1"/>
+          </a:fontRef>
+        </p:style>
+        <p:txBody>
+          <a:bodyPr rtlCol="0" anchor="ctr"/>
+          <a:lstStyle/>
+          <a:p>
+            <a:pPr algn="ctr"/>
+            <a:endParaRPr lang="en-US"/>
+          </a:p>
+        </p:txBody>
+      </p:sp>
+      <p:pic>
+        <p:nvPicPr>
+          <p:cNvPr id="13" name="Picture 12">
+            <a:extLst>
+              <a:ext uri="{FF2B5EF4-FFF2-40B4-BE49-F238E27FC236}">
+                <a16:creationId xmlns:a16="http://schemas.microsoft.com/office/drawing/2014/main" id="{3722FCBF-121E-7246-806C-2DD2B7DB99E5}"/>
+              </a:ext>
+            </a:extLst>
+          </p:cNvPr>
+          <p:cNvPicPr>
+            <a:picLocks noChangeAspect="1"/>
+          </p:cNvPicPr>
+          <p:nvPr/>
+        </p:nvPicPr>
+        <p:blipFill rotWithShape="1">
+          <a:blip r:embed="rId3"/>
+          <a:srcRect l="-311" t="11797" r="90477" b="63836"/>
+          <a:stretch/>
+        </p:blipFill>
+        <p:spPr>
+          <a:xfrm>
+            <a:off x="1209895" y="3542765"/>
+            <a:ext cx="377027" cy="778477"/>
+          </a:xfrm>
+          <a:prstGeom prst="rect">
+            <a:avLst/>
+          </a:prstGeom>
+        </p:spPr>
+      </p:pic>
+      <p:pic>
+        <p:nvPicPr>
+          <p:cNvPr id="14" name="Picture 13">
+            <a:extLst>
+              <a:ext uri="{FF2B5EF4-FFF2-40B4-BE49-F238E27FC236}">
+                <a16:creationId xmlns:a16="http://schemas.microsoft.com/office/drawing/2014/main" id="{29E2820B-4686-6543-BE1E-6468F9A77D0B}"/>
+              </a:ext>
+            </a:extLst>
+          </p:cNvPr>
+          <p:cNvPicPr>
+            <a:picLocks noChangeAspect="1"/>
+          </p:cNvPicPr>
+          <p:nvPr/>
+        </p:nvPicPr>
+        <p:blipFill rotWithShape="1">
+          <a:blip r:embed="rId3"/>
+          <a:srcRect l="-929" t="78226" r="91042" b="3265"/>
+          <a:stretch/>
+        </p:blipFill>
+        <p:spPr>
+          <a:xfrm>
+            <a:off x="1195481" y="5933020"/>
+            <a:ext cx="379084" cy="591350"/>
+          </a:xfrm>
+          <a:prstGeom prst="rect">
+            <a:avLst/>
+          </a:prstGeom>
+        </p:spPr>
+      </p:pic>
+      <p:pic>
+        <p:nvPicPr>
+          <p:cNvPr id="15" name="Picture 14">
+            <a:extLst>
+              <a:ext uri="{FF2B5EF4-FFF2-40B4-BE49-F238E27FC236}">
+                <a16:creationId xmlns:a16="http://schemas.microsoft.com/office/drawing/2014/main" id="{203215C0-D9CF-BC4C-A49A-BE43BEF60360}"/>
+              </a:ext>
+            </a:extLst>
+          </p:cNvPr>
+          <p:cNvPicPr>
+            <a:picLocks noChangeAspect="1"/>
+          </p:cNvPicPr>
+          <p:nvPr/>
+        </p:nvPicPr>
+        <p:blipFill rotWithShape="1">
+          <a:blip r:embed="rId3"/>
+          <a:srcRect l="-2175" t="37638" r="92287" b="43852"/>
+          <a:stretch/>
+        </p:blipFill>
+        <p:spPr>
+          <a:xfrm>
+            <a:off x="1134052" y="4472079"/>
+            <a:ext cx="379084" cy="591350"/>
+          </a:xfrm>
+          <a:prstGeom prst="rect">
+            <a:avLst/>
+          </a:prstGeom>
+        </p:spPr>
+      </p:pic>
+      <p:pic>
+        <p:nvPicPr>
+          <p:cNvPr id="16" name="Picture 15">
+            <a:extLst>
+              <a:ext uri="{FF2B5EF4-FFF2-40B4-BE49-F238E27FC236}">
+                <a16:creationId xmlns:a16="http://schemas.microsoft.com/office/drawing/2014/main" id="{5245EDC6-8F29-8042-BFE2-D2B10CEF1493}"/>
+              </a:ext>
+            </a:extLst>
+          </p:cNvPr>
+          <p:cNvPicPr>
+            <a:picLocks noChangeAspect="1"/>
+          </p:cNvPicPr>
+          <p:nvPr/>
+        </p:nvPicPr>
+        <p:blipFill rotWithShape="1">
+          <a:blip r:embed="rId3"/>
+          <a:srcRect l="-929" t="63517" r="91977" b="26129"/>
+          <a:stretch/>
+        </p:blipFill>
+        <p:spPr>
+          <a:xfrm>
+            <a:off x="1183124" y="5375196"/>
+            <a:ext cx="343268" cy="330791"/>
+          </a:xfrm>
+          <a:prstGeom prst="rect">
+            <a:avLst/>
+          </a:prstGeom>
+        </p:spPr>
+      </p:pic>
     </p:spTree>
     <p:extLst>
       <p:ext uri="{BB962C8B-B14F-4D97-AF65-F5344CB8AC3E}">
@@ -5026,7 +6021,7 @@
 </p:sld>
 </file>
 
-<file path=ppt/slides/slide4.xml><?xml version="1.0" encoding="utf-8"?>
+<file path=ppt/slides/slide5.xml><?xml version="1.0" encoding="utf-8"?>
 <p:sld xmlns:a="http://schemas.openxmlformats.org/drawingml/2006/main" xmlns:r="http://schemas.openxmlformats.org/officeDocument/2006/relationships" xmlns:p="http://schemas.openxmlformats.org/presentationml/2006/main">
   <p:cSld>
     <p:spTree>
@@ -5205,7 +6200,7 @@
 </p:sld>
 </file>
 
-<file path=ppt/slides/slide5.xml><?xml version="1.0" encoding="utf-8"?>
+<file path=ppt/slides/slide6.xml><?xml version="1.0" encoding="utf-8"?>
 <p:sld xmlns:a="http://schemas.openxmlformats.org/drawingml/2006/main" xmlns:r="http://schemas.openxmlformats.org/officeDocument/2006/relationships" xmlns:p="http://schemas.openxmlformats.org/presentationml/2006/main">
   <p:cSld>
     <p:spTree>
@@ -5384,7 +6379,7 @@
 </p:sld>
 </file>
 
-<file path=ppt/slides/slide6.xml><?xml version="1.0" encoding="utf-8"?>
+<file path=ppt/slides/slide7.xml><?xml version="1.0" encoding="utf-8"?>
 <p:sld xmlns:a="http://schemas.openxmlformats.org/drawingml/2006/main" xmlns:r="http://schemas.openxmlformats.org/officeDocument/2006/relationships" xmlns:p="http://schemas.openxmlformats.org/presentationml/2006/main">
   <p:cSld>
     <p:spTree>
@@ -5706,7 +6701,7 @@
 </p:sld>
 </file>
 
-<file path=ppt/slides/slide7.xml><?xml version="1.0" encoding="utf-8"?>
+<file path=ppt/slides/slide8.xml><?xml version="1.0" encoding="utf-8"?>
 <p:sld xmlns:a="http://schemas.openxmlformats.org/drawingml/2006/main" xmlns:r="http://schemas.openxmlformats.org/officeDocument/2006/relationships" xmlns:p="http://schemas.openxmlformats.org/presentationml/2006/main">
   <p:cSld>
     <p:spTree>
@@ -5887,7 +6882,7 @@
 </p:sld>
 </file>
 
-<file path=ppt/slides/slide8.xml><?xml version="1.0" encoding="utf-8"?>
+<file path=ppt/slides/slide9.xml><?xml version="1.0" encoding="utf-8"?>
 <p:sld xmlns:a="http://schemas.openxmlformats.org/drawingml/2006/main" xmlns:r="http://schemas.openxmlformats.org/officeDocument/2006/relationships" xmlns:p="http://schemas.openxmlformats.org/presentationml/2006/main">
   <p:cSld>
     <p:spTree>
@@ -6163,173 +7158,6 @@
     <p:extLst>
       <p:ext uri="{BB962C8B-B14F-4D97-AF65-F5344CB8AC3E}">
         <p14:creationId xmlns:p14="http://schemas.microsoft.com/office/powerpoint/2010/main" val="1615842868"/>
-      </p:ext>
-    </p:extLst>
-  </p:cSld>
-  <p:clrMapOvr>
-    <a:masterClrMapping/>
-  </p:clrMapOvr>
-</p:sld>
-</file>
-
-<file path=ppt/slides/slide9.xml><?xml version="1.0" encoding="utf-8"?>
-<p:sld xmlns:a="http://schemas.openxmlformats.org/drawingml/2006/main" xmlns:r="http://schemas.openxmlformats.org/officeDocument/2006/relationships" xmlns:p="http://schemas.openxmlformats.org/presentationml/2006/main">
-  <p:cSld>
-    <p:spTree>
-      <p:nvGrpSpPr>
-        <p:cNvPr id="1" name=""/>
-        <p:cNvGrpSpPr/>
-        <p:nvPr/>
-      </p:nvGrpSpPr>
-      <p:grpSpPr>
-        <a:xfrm>
-          <a:off x="0" y="0"/>
-          <a:ext cx="0" cy="0"/>
-          <a:chOff x="0" y="0"/>
-          <a:chExt cx="0" cy="0"/>
-        </a:xfrm>
-      </p:grpSpPr>
-      <p:sp>
-        <p:nvSpPr>
-          <p:cNvPr id="2" name="Title 1">
-            <a:extLst>
-              <a:ext uri="{FF2B5EF4-FFF2-40B4-BE49-F238E27FC236}">
-                <a16:creationId xmlns:a16="http://schemas.microsoft.com/office/drawing/2014/main" id="{2158FDC7-10D5-E142-8149-947DED87180F}"/>
-              </a:ext>
-            </a:extLst>
-          </p:cNvPr>
-          <p:cNvSpPr>
-            <a:spLocks noGrp="1"/>
-          </p:cNvSpPr>
-          <p:nvPr>
-            <p:ph type="title"/>
-          </p:nvPr>
-        </p:nvSpPr>
-        <p:spPr/>
-        <p:txBody>
-          <a:bodyPr/>
-          <a:lstStyle/>
-          <a:p>
-            <a:endParaRPr lang="en-US"/>
-          </a:p>
-        </p:txBody>
-      </p:sp>
-      <p:sp>
-        <p:nvSpPr>
-          <p:cNvPr id="3" name="Content Placeholder 2">
-            <a:extLst>
-              <a:ext uri="{FF2B5EF4-FFF2-40B4-BE49-F238E27FC236}">
-                <a16:creationId xmlns:a16="http://schemas.microsoft.com/office/drawing/2014/main" id="{C1E47498-9D6F-DF4B-A768-5EAE9ED47966}"/>
-              </a:ext>
-            </a:extLst>
-          </p:cNvPr>
-          <p:cNvSpPr>
-            <a:spLocks noGrp="1"/>
-          </p:cNvSpPr>
-          <p:nvPr>
-            <p:ph idx="1"/>
-          </p:nvPr>
-        </p:nvSpPr>
-        <p:spPr/>
-        <p:txBody>
-          <a:bodyPr/>
-          <a:lstStyle/>
-          <a:p>
-            <a:endParaRPr lang="en-US" dirty="0"/>
-          </a:p>
-        </p:txBody>
-      </p:sp>
-      <p:pic>
-        <p:nvPicPr>
-          <p:cNvPr id="4" name="Picture 3">
-            <a:extLst>
-              <a:ext uri="{FF2B5EF4-FFF2-40B4-BE49-F238E27FC236}">
-                <a16:creationId xmlns:a16="http://schemas.microsoft.com/office/drawing/2014/main" id="{191E27FA-A770-4D4D-9C5D-B392D316FF30}"/>
-              </a:ext>
-            </a:extLst>
-          </p:cNvPr>
-          <p:cNvPicPr>
-            <a:picLocks noChangeAspect="1"/>
-          </p:cNvPicPr>
-          <p:nvPr/>
-        </p:nvPicPr>
-        <p:blipFill>
-          <a:blip r:embed="rId2"/>
-          <a:srcRect/>
-          <a:stretch/>
-        </p:blipFill>
-        <p:spPr>
-          <a:xfrm>
-            <a:off x="4415837" y="3454592"/>
-            <a:ext cx="3107431" cy="3107431"/>
-          </a:xfrm>
-          <a:prstGeom prst="rect">
-            <a:avLst/>
-          </a:prstGeom>
-        </p:spPr>
-      </p:pic>
-      <p:pic>
-        <p:nvPicPr>
-          <p:cNvPr id="5" name="Picture 4">
-            <a:extLst>
-              <a:ext uri="{FF2B5EF4-FFF2-40B4-BE49-F238E27FC236}">
-                <a16:creationId xmlns:a16="http://schemas.microsoft.com/office/drawing/2014/main" id="{BAB902EB-18C1-DC4D-BC59-12AA868E5046}"/>
-              </a:ext>
-            </a:extLst>
-          </p:cNvPr>
-          <p:cNvPicPr>
-            <a:picLocks noChangeAspect="1"/>
-          </p:cNvPicPr>
-          <p:nvPr/>
-        </p:nvPicPr>
-        <p:blipFill>
-          <a:blip r:embed="rId3"/>
-          <a:srcRect/>
-          <a:stretch/>
-        </p:blipFill>
-        <p:spPr>
-          <a:xfrm>
-            <a:off x="1561303" y="372752"/>
-            <a:ext cx="3107431" cy="3107431"/>
-          </a:xfrm>
-          <a:prstGeom prst="rect">
-            <a:avLst/>
-          </a:prstGeom>
-        </p:spPr>
-      </p:pic>
-      <p:pic>
-        <p:nvPicPr>
-          <p:cNvPr id="6" name="Picture 5">
-            <a:extLst>
-              <a:ext uri="{FF2B5EF4-FFF2-40B4-BE49-F238E27FC236}">
-                <a16:creationId xmlns:a16="http://schemas.microsoft.com/office/drawing/2014/main" id="{C8F9E206-C36E-0D46-BC02-D542F3C36D53}"/>
-              </a:ext>
-            </a:extLst>
-          </p:cNvPr>
-          <p:cNvPicPr>
-            <a:picLocks noChangeAspect="1"/>
-          </p:cNvPicPr>
-          <p:nvPr/>
-        </p:nvPicPr>
-        <p:blipFill>
-          <a:blip r:embed="rId4"/>
-          <a:srcRect/>
-          <a:stretch/>
-        </p:blipFill>
-        <p:spPr>
-          <a:xfrm>
-            <a:off x="1561303" y="3429000"/>
-            <a:ext cx="3107431" cy="3107431"/>
-          </a:xfrm>
-          <a:prstGeom prst="rect">
-            <a:avLst/>
-          </a:prstGeom>
-        </p:spPr>
-      </p:pic>
-    </p:spTree>
-    <p:extLst>
-      <p:ext uri="{BB962C8B-B14F-4D97-AF65-F5344CB8AC3E}">
-        <p14:creationId xmlns:p14="http://schemas.microsoft.com/office/powerpoint/2010/main" val="847945932"/>
       </p:ext>
     </p:extLst>
   </p:cSld>

</xml_diff>